<commit_message>
More practice files, more class materials.
</commit_message>
<xml_diff>
--- a/00_Lecture_Notes/Packet #1-16- Introduction.pptx
+++ b/00_Lecture_Notes/Packet #1-16- Introduction.pptx
@@ -231,7 +231,7 @@
           <a:bodyPr lIns="0" rIns="0" tIns="0" bIns="0" anchor="b"/>
           <a:p>
             <a:pPr algn="r"/>
-            <a:fld id="{3D64EF02-BB1E-4857-AA70-164F22A17226}" type="slidenum">
+            <a:fld id="{2F0EDF5A-951C-4C18-9D35-DDC9CACF6AB7}" type="slidenum">
               <a:rPr lang="en-US" sz="1400">
                 <a:latin typeface="Times New Roman"/>
               </a:rPr>
@@ -277,7 +277,7 @@
         <p:spPr>
           <a:xfrm>
             <a:off x="914400" y="4419720"/>
-            <a:ext cx="5028480" cy="4190400"/>
+            <a:ext cx="5027760" cy="4189680"/>
           </a:xfrm>
           <a:prstGeom prst="rect">
             <a:avLst/>
@@ -299,7 +299,7 @@
         <p:spPr>
           <a:xfrm>
             <a:off x="3886200" y="8839080"/>
-            <a:ext cx="2971080" cy="456480"/>
+            <a:ext cx="2970360" cy="455760"/>
           </a:xfrm>
           <a:prstGeom prst="rect">
             <a:avLst/>
@@ -345,7 +345,7 @@
         <p:spPr>
           <a:xfrm>
             <a:off x="914400" y="4419720"/>
-            <a:ext cx="5028480" cy="4190400"/>
+            <a:ext cx="5027760" cy="4189680"/>
           </a:xfrm>
           <a:prstGeom prst="rect">
             <a:avLst/>
@@ -367,7 +367,7 @@
         <p:spPr>
           <a:xfrm>
             <a:off x="3886200" y="8839080"/>
-            <a:ext cx="2971080" cy="456480"/>
+            <a:ext cx="2970360" cy="455760"/>
           </a:xfrm>
           <a:prstGeom prst="rect">
             <a:avLst/>
@@ -413,7 +413,7 @@
         <p:spPr>
           <a:xfrm>
             <a:off x="914400" y="4419720"/>
-            <a:ext cx="5028480" cy="4190400"/>
+            <a:ext cx="5027760" cy="4189680"/>
           </a:xfrm>
           <a:prstGeom prst="rect">
             <a:avLst/>
@@ -435,7 +435,7 @@
         <p:spPr>
           <a:xfrm>
             <a:off x="3886200" y="8839080"/>
-            <a:ext cx="2971080" cy="456480"/>
+            <a:ext cx="2970360" cy="455760"/>
           </a:xfrm>
           <a:prstGeom prst="rect">
             <a:avLst/>
@@ -481,7 +481,7 @@
         <p:spPr>
           <a:xfrm>
             <a:off x="914400" y="4419720"/>
-            <a:ext cx="5028480" cy="4190400"/>
+            <a:ext cx="5027760" cy="4189680"/>
           </a:xfrm>
           <a:prstGeom prst="rect">
             <a:avLst/>
@@ -503,7 +503,7 @@
         <p:spPr>
           <a:xfrm>
             <a:off x="3886200" y="8839080"/>
-            <a:ext cx="2971080" cy="456480"/>
+            <a:ext cx="2970360" cy="455760"/>
           </a:xfrm>
           <a:prstGeom prst="rect">
             <a:avLst/>
@@ -549,7 +549,7 @@
         <p:spPr>
           <a:xfrm>
             <a:off x="914400" y="4419720"/>
-            <a:ext cx="5028480" cy="4190400"/>
+            <a:ext cx="5027760" cy="4189680"/>
           </a:xfrm>
           <a:prstGeom prst="rect">
             <a:avLst/>
@@ -571,7 +571,7 @@
         <p:spPr>
           <a:xfrm>
             <a:off x="3886200" y="8839080"/>
-            <a:ext cx="2971080" cy="456480"/>
+            <a:ext cx="2970360" cy="455760"/>
           </a:xfrm>
           <a:prstGeom prst="rect">
             <a:avLst/>
@@ -617,7 +617,7 @@
         <p:spPr>
           <a:xfrm>
             <a:off x="914400" y="4419720"/>
-            <a:ext cx="5028480" cy="4190400"/>
+            <a:ext cx="5027760" cy="4189680"/>
           </a:xfrm>
           <a:prstGeom prst="rect">
             <a:avLst/>
@@ -639,7 +639,7 @@
         <p:spPr>
           <a:xfrm>
             <a:off x="3886200" y="8839080"/>
-            <a:ext cx="2971080" cy="456480"/>
+            <a:ext cx="2970360" cy="455760"/>
           </a:xfrm>
           <a:prstGeom prst="rect">
             <a:avLst/>
@@ -685,7 +685,7 @@
         <p:spPr>
           <a:xfrm>
             <a:off x="914400" y="4419720"/>
-            <a:ext cx="5028480" cy="4190400"/>
+            <a:ext cx="5027760" cy="4189680"/>
           </a:xfrm>
           <a:prstGeom prst="rect">
             <a:avLst/>
@@ -707,7 +707,7 @@
         <p:spPr>
           <a:xfrm>
             <a:off x="3886200" y="8839080"/>
-            <a:ext cx="2971080" cy="456480"/>
+            <a:ext cx="2970360" cy="455760"/>
           </a:xfrm>
           <a:prstGeom prst="rect">
             <a:avLst/>
@@ -753,7 +753,7 @@
         <p:spPr>
           <a:xfrm>
             <a:off x="914400" y="4419720"/>
-            <a:ext cx="5028480" cy="4190400"/>
+            <a:ext cx="5027760" cy="4189680"/>
           </a:xfrm>
           <a:prstGeom prst="rect">
             <a:avLst/>
@@ -775,7 +775,7 @@
         <p:spPr>
           <a:xfrm>
             <a:off x="3886200" y="8839080"/>
-            <a:ext cx="2971080" cy="456480"/>
+            <a:ext cx="2970360" cy="455760"/>
           </a:xfrm>
           <a:prstGeom prst="rect">
             <a:avLst/>
@@ -821,7 +821,7 @@
         <p:spPr>
           <a:xfrm>
             <a:off x="914400" y="4419720"/>
-            <a:ext cx="5028480" cy="4190400"/>
+            <a:ext cx="5027760" cy="4189680"/>
           </a:xfrm>
           <a:prstGeom prst="rect">
             <a:avLst/>
@@ -843,7 +843,7 @@
         <p:spPr>
           <a:xfrm>
             <a:off x="3886200" y="8839080"/>
-            <a:ext cx="2971080" cy="456480"/>
+            <a:ext cx="2970360" cy="455760"/>
           </a:xfrm>
           <a:prstGeom prst="rect">
             <a:avLst/>
@@ -889,7 +889,7 @@
         <p:spPr>
           <a:xfrm>
             <a:off x="914400" y="4419720"/>
-            <a:ext cx="5028480" cy="4190400"/>
+            <a:ext cx="5027760" cy="4189680"/>
           </a:xfrm>
           <a:prstGeom prst="rect">
             <a:avLst/>
@@ -911,7 +911,7 @@
         <p:spPr>
           <a:xfrm>
             <a:off x="3886200" y="8839080"/>
-            <a:ext cx="2971080" cy="456480"/>
+            <a:ext cx="2970360" cy="455760"/>
           </a:xfrm>
           <a:prstGeom prst="rect">
             <a:avLst/>
@@ -957,7 +957,7 @@
         <p:spPr>
           <a:xfrm>
             <a:off x="914400" y="4419720"/>
-            <a:ext cx="5028480" cy="4190400"/>
+            <a:ext cx="5027760" cy="4189680"/>
           </a:xfrm>
           <a:prstGeom prst="rect">
             <a:avLst/>
@@ -979,7 +979,7 @@
         <p:spPr>
           <a:xfrm>
             <a:off x="3886200" y="8839080"/>
-            <a:ext cx="2971080" cy="456480"/>
+            <a:ext cx="2970360" cy="455760"/>
           </a:xfrm>
           <a:prstGeom prst="rect">
             <a:avLst/>
@@ -1025,7 +1025,7 @@
         <p:spPr>
           <a:xfrm>
             <a:off x="914400" y="4419720"/>
-            <a:ext cx="5028480" cy="4190400"/>
+            <a:ext cx="5027760" cy="4189680"/>
           </a:xfrm>
           <a:prstGeom prst="rect">
             <a:avLst/>
@@ -1047,7 +1047,7 @@
         <p:spPr>
           <a:xfrm>
             <a:off x="3886200" y="8839080"/>
-            <a:ext cx="2971080" cy="456480"/>
+            <a:ext cx="2970360" cy="455760"/>
           </a:xfrm>
           <a:prstGeom prst="rect">
             <a:avLst/>
@@ -1093,7 +1093,7 @@
         <p:spPr>
           <a:xfrm>
             <a:off x="914400" y="4419720"/>
-            <a:ext cx="5028480" cy="4190400"/>
+            <a:ext cx="5027760" cy="4189680"/>
           </a:xfrm>
           <a:prstGeom prst="rect">
             <a:avLst/>
@@ -1115,7 +1115,7 @@
         <p:spPr>
           <a:xfrm>
             <a:off x="3886200" y="8839080"/>
-            <a:ext cx="2971080" cy="456480"/>
+            <a:ext cx="2970360" cy="455760"/>
           </a:xfrm>
           <a:prstGeom prst="rect">
             <a:avLst/>
@@ -1161,7 +1161,7 @@
         <p:spPr>
           <a:xfrm>
             <a:off x="914400" y="4419720"/>
-            <a:ext cx="5028480" cy="4190400"/>
+            <a:ext cx="5027760" cy="4189680"/>
           </a:xfrm>
           <a:prstGeom prst="rect">
             <a:avLst/>
@@ -1183,7 +1183,7 @@
         <p:spPr>
           <a:xfrm>
             <a:off x="3886200" y="8839080"/>
-            <a:ext cx="2971080" cy="456480"/>
+            <a:ext cx="2970360" cy="455760"/>
           </a:xfrm>
           <a:prstGeom prst="rect">
             <a:avLst/>
@@ -1229,7 +1229,7 @@
         <p:spPr>
           <a:xfrm>
             <a:off x="914400" y="4419720"/>
-            <a:ext cx="5028480" cy="4190400"/>
+            <a:ext cx="5027760" cy="4189680"/>
           </a:xfrm>
           <a:prstGeom prst="rect">
             <a:avLst/>
@@ -1251,7 +1251,7 @@
         <p:spPr>
           <a:xfrm>
             <a:off x="3886200" y="8839080"/>
-            <a:ext cx="2971080" cy="456480"/>
+            <a:ext cx="2970360" cy="455760"/>
           </a:xfrm>
           <a:prstGeom prst="rect">
             <a:avLst/>
@@ -1297,7 +1297,7 @@
         <p:spPr>
           <a:xfrm>
             <a:off x="914400" y="4419720"/>
-            <a:ext cx="5028480" cy="4190400"/>
+            <a:ext cx="5027760" cy="4189680"/>
           </a:xfrm>
           <a:prstGeom prst="rect">
             <a:avLst/>
@@ -1319,7 +1319,7 @@
         <p:spPr>
           <a:xfrm>
             <a:off x="3886200" y="8839080"/>
-            <a:ext cx="2971080" cy="456480"/>
+            <a:ext cx="2970360" cy="455760"/>
           </a:xfrm>
           <a:prstGeom prst="rect">
             <a:avLst/>
@@ -1365,7 +1365,7 @@
         <p:spPr>
           <a:xfrm>
             <a:off x="914400" y="4419720"/>
-            <a:ext cx="5028480" cy="4190400"/>
+            <a:ext cx="5027760" cy="4189680"/>
           </a:xfrm>
           <a:prstGeom prst="rect">
             <a:avLst/>
@@ -1387,7 +1387,7 @@
         <p:spPr>
           <a:xfrm>
             <a:off x="3886200" y="8839080"/>
-            <a:ext cx="2971080" cy="456480"/>
+            <a:ext cx="2970360" cy="455760"/>
           </a:xfrm>
           <a:prstGeom prst="rect">
             <a:avLst/>
@@ -1433,7 +1433,7 @@
         <p:spPr>
           <a:xfrm>
             <a:off x="914400" y="4419720"/>
-            <a:ext cx="5028480" cy="4190400"/>
+            <a:ext cx="5027760" cy="4189680"/>
           </a:xfrm>
           <a:prstGeom prst="rect">
             <a:avLst/>
@@ -1455,7 +1455,7 @@
         <p:spPr>
           <a:xfrm>
             <a:off x="3886200" y="8839080"/>
-            <a:ext cx="2971080" cy="456480"/>
+            <a:ext cx="2970360" cy="455760"/>
           </a:xfrm>
           <a:prstGeom prst="rect">
             <a:avLst/>
@@ -1501,7 +1501,7 @@
         <p:spPr>
           <a:xfrm>
             <a:off x="914400" y="4419720"/>
-            <a:ext cx="5028480" cy="4190400"/>
+            <a:ext cx="5027760" cy="4189680"/>
           </a:xfrm>
           <a:prstGeom prst="rect">
             <a:avLst/>
@@ -1523,7 +1523,7 @@
         <p:spPr>
           <a:xfrm>
             <a:off x="3886200" y="8839080"/>
-            <a:ext cx="2971080" cy="456480"/>
+            <a:ext cx="2970360" cy="455760"/>
           </a:xfrm>
           <a:prstGeom prst="rect">
             <a:avLst/>
@@ -1569,7 +1569,7 @@
         <p:spPr>
           <a:xfrm>
             <a:off x="914400" y="4419720"/>
-            <a:ext cx="5028480" cy="4190400"/>
+            <a:ext cx="5027760" cy="4189680"/>
           </a:xfrm>
           <a:prstGeom prst="rect">
             <a:avLst/>
@@ -1591,7 +1591,7 @@
         <p:spPr>
           <a:xfrm>
             <a:off x="3886200" y="8839080"/>
-            <a:ext cx="2971080" cy="456480"/>
+            <a:ext cx="2970360" cy="455760"/>
           </a:xfrm>
           <a:prstGeom prst="rect">
             <a:avLst/>
@@ -1637,7 +1637,7 @@
         <p:spPr>
           <a:xfrm>
             <a:off x="914400" y="4419720"/>
-            <a:ext cx="5028480" cy="4190400"/>
+            <a:ext cx="5027760" cy="4189680"/>
           </a:xfrm>
           <a:prstGeom prst="rect">
             <a:avLst/>
@@ -1659,7 +1659,7 @@
         <p:spPr>
           <a:xfrm>
             <a:off x="3886200" y="8839080"/>
-            <a:ext cx="2971080" cy="456480"/>
+            <a:ext cx="2970360" cy="455760"/>
           </a:xfrm>
           <a:prstGeom prst="rect">
             <a:avLst/>
@@ -1705,7 +1705,7 @@
         <p:spPr>
           <a:xfrm>
             <a:off x="914400" y="4419720"/>
-            <a:ext cx="5028480" cy="4190400"/>
+            <a:ext cx="5027760" cy="4189680"/>
           </a:xfrm>
           <a:prstGeom prst="rect">
             <a:avLst/>
@@ -1727,7 +1727,7 @@
         <p:spPr>
           <a:xfrm>
             <a:off x="3886200" y="8839080"/>
-            <a:ext cx="2971080" cy="456480"/>
+            <a:ext cx="2970360" cy="455760"/>
           </a:xfrm>
           <a:prstGeom prst="rect">
             <a:avLst/>
@@ -1773,7 +1773,7 @@
         <p:spPr>
           <a:xfrm>
             <a:off x="914400" y="4419720"/>
-            <a:ext cx="5028480" cy="4190400"/>
+            <a:ext cx="5027760" cy="4189680"/>
           </a:xfrm>
           <a:prstGeom prst="rect">
             <a:avLst/>
@@ -1795,7 +1795,7 @@
         <p:spPr>
           <a:xfrm>
             <a:off x="3886200" y="8839080"/>
-            <a:ext cx="2971080" cy="456480"/>
+            <a:ext cx="2970360" cy="455760"/>
           </a:xfrm>
           <a:prstGeom prst="rect">
             <a:avLst/>
@@ -1841,7 +1841,7 @@
         <p:spPr>
           <a:xfrm>
             <a:off x="914400" y="4419720"/>
-            <a:ext cx="5028480" cy="4190400"/>
+            <a:ext cx="5027760" cy="4189680"/>
           </a:xfrm>
           <a:prstGeom prst="rect">
             <a:avLst/>
@@ -1863,7 +1863,7 @@
         <p:spPr>
           <a:xfrm>
             <a:off x="3886200" y="8839080"/>
-            <a:ext cx="2971080" cy="456480"/>
+            <a:ext cx="2970360" cy="455760"/>
           </a:xfrm>
           <a:prstGeom prst="rect">
             <a:avLst/>
@@ -1909,7 +1909,7 @@
         <p:spPr>
           <a:xfrm>
             <a:off x="914400" y="4419720"/>
-            <a:ext cx="5028480" cy="4190400"/>
+            <a:ext cx="5027760" cy="4189680"/>
           </a:xfrm>
           <a:prstGeom prst="rect">
             <a:avLst/>
@@ -1931,7 +1931,7 @@
         <p:spPr>
           <a:xfrm>
             <a:off x="3886200" y="8839080"/>
-            <a:ext cx="2971080" cy="456480"/>
+            <a:ext cx="2970360" cy="455760"/>
           </a:xfrm>
           <a:prstGeom prst="rect">
             <a:avLst/>
@@ -1977,7 +1977,7 @@
         <p:spPr>
           <a:xfrm>
             <a:off x="914400" y="4419720"/>
-            <a:ext cx="5028480" cy="4190400"/>
+            <a:ext cx="5027760" cy="4189680"/>
           </a:xfrm>
           <a:prstGeom prst="rect">
             <a:avLst/>
@@ -1999,7 +1999,7 @@
         <p:spPr>
           <a:xfrm>
             <a:off x="3886200" y="8839080"/>
-            <a:ext cx="2971080" cy="456480"/>
+            <a:ext cx="2970360" cy="455760"/>
           </a:xfrm>
           <a:prstGeom prst="rect">
             <a:avLst/>
@@ -2045,7 +2045,7 @@
         <p:spPr>
           <a:xfrm>
             <a:off x="914400" y="4419720"/>
-            <a:ext cx="5028480" cy="4190400"/>
+            <a:ext cx="5027760" cy="4189680"/>
           </a:xfrm>
           <a:prstGeom prst="rect">
             <a:avLst/>
@@ -2067,7 +2067,7 @@
         <p:spPr>
           <a:xfrm>
             <a:off x="3886200" y="8839080"/>
-            <a:ext cx="2971080" cy="456480"/>
+            <a:ext cx="2970360" cy="455760"/>
           </a:xfrm>
           <a:prstGeom prst="rect">
             <a:avLst/>
@@ -2113,7 +2113,7 @@
         <p:spPr>
           <a:xfrm>
             <a:off x="914400" y="4419720"/>
-            <a:ext cx="5028480" cy="4190400"/>
+            <a:ext cx="5027760" cy="4189680"/>
           </a:xfrm>
           <a:prstGeom prst="rect">
             <a:avLst/>
@@ -2135,7 +2135,7 @@
         <p:spPr>
           <a:xfrm>
             <a:off x="3886200" y="8839080"/>
-            <a:ext cx="2971080" cy="456480"/>
+            <a:ext cx="2970360" cy="455760"/>
           </a:xfrm>
           <a:prstGeom prst="rect">
             <a:avLst/>
@@ -2181,7 +2181,7 @@
         <p:spPr>
           <a:xfrm>
             <a:off x="914400" y="4419720"/>
-            <a:ext cx="5028480" cy="4190400"/>
+            <a:ext cx="5027760" cy="4189680"/>
           </a:xfrm>
           <a:prstGeom prst="rect">
             <a:avLst/>
@@ -2203,7 +2203,7 @@
         <p:spPr>
           <a:xfrm>
             <a:off x="3886200" y="8839080"/>
-            <a:ext cx="2971080" cy="456480"/>
+            <a:ext cx="2970360" cy="455760"/>
           </a:xfrm>
           <a:prstGeom prst="rect">
             <a:avLst/>
@@ -2249,7 +2249,7 @@
         <p:spPr>
           <a:xfrm>
             <a:off x="914400" y="4419720"/>
-            <a:ext cx="5028480" cy="4190400"/>
+            <a:ext cx="5027760" cy="4189680"/>
           </a:xfrm>
           <a:prstGeom prst="rect">
             <a:avLst/>
@@ -2271,7 +2271,7 @@
         <p:spPr>
           <a:xfrm>
             <a:off x="3886200" y="8839080"/>
-            <a:ext cx="2971080" cy="456480"/>
+            <a:ext cx="2970360" cy="455760"/>
           </a:xfrm>
           <a:prstGeom prst="rect">
             <a:avLst/>
@@ -2317,7 +2317,7 @@
         <p:spPr>
           <a:xfrm>
             <a:off x="914400" y="4419720"/>
-            <a:ext cx="5028480" cy="4190400"/>
+            <a:ext cx="5027760" cy="4189680"/>
           </a:xfrm>
           <a:prstGeom prst="rect">
             <a:avLst/>
@@ -2339,7 +2339,7 @@
         <p:spPr>
           <a:xfrm>
             <a:off x="3886200" y="8839080"/>
-            <a:ext cx="2971080" cy="456480"/>
+            <a:ext cx="2970360" cy="455760"/>
           </a:xfrm>
           <a:prstGeom prst="rect">
             <a:avLst/>
@@ -4710,7 +4710,7 @@
         <p:spPr>
           <a:xfrm>
             <a:off x="5410080" y="6134040"/>
-            <a:ext cx="3712320" cy="658080"/>
+            <a:ext cx="3711600" cy="657360"/>
           </a:xfrm>
           <a:prstGeom prst="rect">
             <a:avLst/>
@@ -4735,7 +4735,7 @@
         <p:spPr>
           <a:xfrm>
             <a:off x="96840" y="6145200"/>
-            <a:ext cx="3864960" cy="634320"/>
+            <a:ext cx="3864240" cy="633600"/>
           </a:xfrm>
           <a:prstGeom prst="rect">
             <a:avLst/>
@@ -4754,7 +4754,7 @@
         <p:spPr>
           <a:xfrm>
             <a:off x="838080" y="0"/>
-            <a:ext cx="8076600" cy="488160"/>
+            <a:ext cx="8075880" cy="487440"/>
           </a:xfrm>
           <a:prstGeom prst="rect">
             <a:avLst/>
@@ -4774,7 +4774,7 @@
         <p:spPr>
           <a:xfrm>
             <a:off x="0" y="4114800"/>
-            <a:ext cx="3276000" cy="488160"/>
+            <a:ext cx="3275280" cy="487440"/>
           </a:xfrm>
           <a:prstGeom prst="rect">
             <a:avLst/>
@@ -4794,7 +4794,7 @@
         <p:spPr>
           <a:xfrm>
             <a:off x="4510080" y="1193760"/>
-            <a:ext cx="4650480" cy="5707800"/>
+            <a:ext cx="4649760" cy="5707080"/>
           </a:xfrm>
           <a:prstGeom prst="rect">
             <a:avLst/>
@@ -4830,7 +4830,7 @@
         <p:spPr>
           <a:xfrm>
             <a:off x="1771560" y="123840"/>
-            <a:ext cx="5581080" cy="913680"/>
+            <a:ext cx="5580360" cy="912960"/>
           </a:xfrm>
           <a:prstGeom prst="rect">
             <a:avLst/>
@@ -4855,7 +4855,7 @@
         <p:spPr>
           <a:xfrm>
             <a:off x="0" y="5261040"/>
-            <a:ext cx="9316440" cy="1643760"/>
+            <a:ext cx="9315720" cy="1643040"/>
           </a:xfrm>
           <a:prstGeom prst="rect">
             <a:avLst/>
@@ -4877,8 +4877,8 @@
         </p:nvSpPr>
         <p:spPr>
           <a:xfrm>
-            <a:off x="457200" y="274680"/>
-            <a:ext cx="8228880" cy="1142640"/>
+            <a:off x="457200" y="273600"/>
+            <a:ext cx="8229240" cy="1144800"/>
           </a:xfrm>
           <a:prstGeom prst="rect">
             <a:avLst/>
@@ -5078,7 +5078,7 @@
         <p:spPr>
           <a:xfrm>
             <a:off x="5410080" y="6134040"/>
-            <a:ext cx="3712320" cy="658080"/>
+            <a:ext cx="3711600" cy="657360"/>
           </a:xfrm>
           <a:prstGeom prst="rect">
             <a:avLst/>
@@ -5103,7 +5103,7 @@
         <p:spPr>
           <a:xfrm>
             <a:off x="96840" y="6145200"/>
-            <a:ext cx="3864960" cy="634320"/>
+            <a:ext cx="3864240" cy="633600"/>
           </a:xfrm>
           <a:prstGeom prst="rect">
             <a:avLst/>
@@ -5313,7 +5313,7 @@
         <p:spPr>
           <a:xfrm>
             <a:off x="228600" y="2133720"/>
-            <a:ext cx="8686080" cy="3047400"/>
+            <a:ext cx="8685360" cy="3046680"/>
           </a:xfrm>
           <a:prstGeom prst="rect">
             <a:avLst/>
@@ -5383,7 +5383,7 @@
         <p:spPr>
           <a:xfrm>
             <a:off x="762120" y="609480"/>
-            <a:ext cx="1929600" cy="1316880"/>
+            <a:ext cx="1928880" cy="1316160"/>
           </a:xfrm>
           <a:prstGeom prst="rect">
             <a:avLst/>
@@ -5395,6 +5395,33 @@
       </p:pic>
     </p:spTree>
   </p:cSld>
+  <p:timing>
+    <p:tnLst>
+      <p:par>
+        <p:cTn id="1" dur="indefinite" restart="never" nodeType="tmRoot">
+          <p:childTnLst>
+            <p:seq>
+              <p:cTn id="2" nodeType="mainSeq"/>
+              <p:prevCondLst>
+                <p:cond delay="0" evt="onPrev">
+                  <p:tgtEl>
+                    <p:sldTgt/>
+                  </p:tgtEl>
+                </p:cond>
+              </p:prevCondLst>
+              <p:nextCondLst>
+                <p:cond delay="0" evt="onNext">
+                  <p:tgtEl>
+                    <p:sldTgt/>
+                  </p:tgtEl>
+                </p:cond>
+              </p:nextCondLst>
+            </p:seq>
+          </p:childTnLst>
+        </p:cTn>
+      </p:par>
+    </p:tnLst>
+  </p:timing>
 </p:sld>
 </file>
 
@@ -5424,7 +5451,7 @@
         <p:spPr>
           <a:xfrm>
             <a:off x="457200" y="274680"/>
-            <a:ext cx="8228880" cy="1142280"/>
+            <a:ext cx="8228160" cy="1141560"/>
           </a:xfrm>
           <a:prstGeom prst="rect">
             <a:avLst/>
@@ -5482,7 +5509,7 @@
         <p:spPr>
           <a:xfrm>
             <a:off x="457200" y="1600200"/>
-            <a:ext cx="8228880" cy="4266360"/>
+            <a:ext cx="8228160" cy="4265640"/>
           </a:xfrm>
           <a:prstGeom prst="rect">
             <a:avLst/>
@@ -5503,7 +5530,7 @@
               <a:buChar char="•"/>
             </a:pPr>
             <a:r>
-              <a:rPr lang="en-US" sz="3200">
+              <a:rPr lang="en-US" sz="2400">
                 <a:solidFill>
                   <a:srgbClr val="ffffff"/>
                 </a:solidFill>
@@ -5522,7 +5549,7 @@
               <a:buChar char="–"/>
             </a:pPr>
             <a:r>
-              <a:rPr lang="en-US" sz="2800">
+              <a:rPr lang="en-US" sz="2400">
                 <a:solidFill>
                   <a:srgbClr val="ffffff"/>
                 </a:solidFill>
@@ -5541,7 +5568,7 @@
               <a:buChar char="–"/>
             </a:pPr>
             <a:r>
-              <a:rPr lang="en-US" sz="2800">
+              <a:rPr lang="en-US" sz="2400">
                 <a:solidFill>
                   <a:srgbClr val="ffffff"/>
                 </a:solidFill>
@@ -5579,7 +5606,7 @@
               <a:buChar char="•"/>
             </a:pPr>
             <a:r>
-              <a:rPr lang="en-US" sz="3200">
+              <a:rPr lang="en-US" sz="2400">
                 <a:solidFill>
                   <a:srgbClr val="ffffff"/>
                 </a:solidFill>
@@ -5593,6 +5620,33 @@
       </p:sp>
     </p:spTree>
   </p:cSld>
+  <p:timing>
+    <p:tnLst>
+      <p:par>
+        <p:cTn id="19" dur="indefinite" restart="never" nodeType="tmRoot">
+          <p:childTnLst>
+            <p:seq>
+              <p:cTn id="20" nodeType="mainSeq"/>
+              <p:prevCondLst>
+                <p:cond delay="0" evt="onPrev">
+                  <p:tgtEl>
+                    <p:sldTgt/>
+                  </p:tgtEl>
+                </p:cond>
+              </p:prevCondLst>
+              <p:nextCondLst>
+                <p:cond delay="0" evt="onNext">
+                  <p:tgtEl>
+                    <p:sldTgt/>
+                  </p:tgtEl>
+                </p:cond>
+              </p:nextCondLst>
+            </p:seq>
+          </p:childTnLst>
+        </p:cTn>
+      </p:par>
+    </p:tnLst>
+  </p:timing>
 </p:sld>
 </file>
 
@@ -5622,7 +5676,7 @@
         <p:spPr>
           <a:xfrm>
             <a:off x="457200" y="274680"/>
-            <a:ext cx="8228880" cy="1142280"/>
+            <a:ext cx="8228160" cy="1141560"/>
           </a:xfrm>
           <a:prstGeom prst="rect">
             <a:avLst/>
@@ -5662,7 +5716,7 @@
         <p:spPr>
           <a:xfrm>
             <a:off x="228600" y="1523880"/>
-            <a:ext cx="8686080" cy="4799880"/>
+            <a:ext cx="8685360" cy="4799160"/>
           </a:xfrm>
           <a:prstGeom prst="rect">
             <a:avLst/>
@@ -5683,7 +5737,7 @@
               <a:buChar char="•"/>
             </a:pPr>
             <a:r>
-              <a:rPr lang="en-US" sz="3200">
+              <a:rPr lang="en-US" sz="2200">
                 <a:solidFill>
                   <a:srgbClr val="ffffff"/>
                 </a:solidFill>
@@ -5702,7 +5756,7 @@
               <a:buChar char="•"/>
             </a:pPr>
             <a:r>
-              <a:rPr lang="en-US" sz="3200">
+              <a:rPr lang="en-US" sz="2200">
                 <a:solidFill>
                   <a:srgbClr val="ffffff"/>
                 </a:solidFill>
@@ -5721,7 +5775,7 @@
               <a:buChar char="–"/>
             </a:pPr>
             <a:r>
-              <a:rPr lang="en-US" sz="2800">
+              <a:rPr lang="en-US" sz="2200">
                 <a:solidFill>
                   <a:srgbClr val="ffffff"/>
                 </a:solidFill>
@@ -5740,7 +5794,7 @@
               <a:buChar char="–"/>
             </a:pPr>
             <a:r>
-              <a:rPr lang="en-US" sz="2800">
+              <a:rPr lang="en-US" sz="2200">
                 <a:solidFill>
                   <a:srgbClr val="ffffff"/>
                 </a:solidFill>
@@ -5759,7 +5813,7 @@
               <a:buChar char="•"/>
             </a:pPr>
             <a:r>
-              <a:rPr lang="en-US" sz="2400">
+              <a:rPr lang="en-US" sz="2200">
                 <a:solidFill>
                   <a:srgbClr val="ffffff"/>
                 </a:solidFill>
@@ -5778,7 +5832,7 @@
               <a:buChar char="•"/>
             </a:pPr>
             <a:r>
-              <a:rPr lang="en-US" sz="3200">
+              <a:rPr lang="en-US" sz="2200">
                 <a:solidFill>
                   <a:srgbClr val="ffffff"/>
                 </a:solidFill>
@@ -5797,7 +5851,7 @@
               <a:buChar char="–"/>
             </a:pPr>
             <a:r>
-              <a:rPr lang="en-US" sz="2800">
+              <a:rPr lang="en-US" sz="2200">
                 <a:solidFill>
                   <a:srgbClr val="ffffff"/>
                 </a:solidFill>
@@ -5806,7 +5860,7 @@
               <a:t>These are the (vaguely) English-like “</a:t>
             </a:r>
             <a:r>
-              <a:rPr i="1" lang="en-US" sz="2800">
+              <a:rPr i="1" lang="en-US" sz="2200">
                 <a:solidFill>
                   <a:srgbClr val="ffffff"/>
                 </a:solidFill>
@@ -5815,7 +5869,7 @@
               <a:t>statements</a:t>
             </a:r>
             <a:r>
-              <a:rPr lang="en-US" sz="2800">
+              <a:rPr lang="en-US" sz="2200">
                 <a:solidFill>
                   <a:srgbClr val="ffffff"/>
                 </a:solidFill>
@@ -5834,7 +5888,7 @@
               <a:buChar char="–"/>
             </a:pPr>
             <a:r>
-              <a:rPr lang="en-US" sz="2800">
+              <a:rPr lang="en-US" sz="2200">
                 <a:solidFill>
                   <a:srgbClr val="ffffff"/>
                 </a:solidFill>
@@ -5843,7 +5897,7 @@
               <a:t>“</a:t>
             </a:r>
             <a:r>
-              <a:rPr i="1" lang="en-US" sz="2800">
+              <a:rPr i="1" lang="en-US" sz="2200">
                 <a:solidFill>
                   <a:srgbClr val="ffffff"/>
                 </a:solidFill>
@@ -5852,7 +5906,7 @@
               <a:t>Compilers</a:t>
             </a:r>
             <a:r>
-              <a:rPr lang="en-US" sz="2800">
+              <a:rPr lang="en-US" sz="2200">
                 <a:solidFill>
                   <a:srgbClr val="ffffff"/>
                 </a:solidFill>
@@ -5866,6 +5920,33 @@
       </p:sp>
     </p:spTree>
   </p:cSld>
+  <p:timing>
+    <p:tnLst>
+      <p:par>
+        <p:cTn id="21" dur="indefinite" restart="never" nodeType="tmRoot">
+          <p:childTnLst>
+            <p:seq>
+              <p:cTn id="22" nodeType="mainSeq"/>
+              <p:prevCondLst>
+                <p:cond delay="0" evt="onPrev">
+                  <p:tgtEl>
+                    <p:sldTgt/>
+                  </p:tgtEl>
+                </p:cond>
+              </p:prevCondLst>
+              <p:nextCondLst>
+                <p:cond delay="0" evt="onNext">
+                  <p:tgtEl>
+                    <p:sldTgt/>
+                  </p:tgtEl>
+                </p:cond>
+              </p:nextCondLst>
+            </p:seq>
+          </p:childTnLst>
+        </p:cTn>
+      </p:par>
+    </p:tnLst>
+  </p:timing>
 </p:sld>
 </file>
 
@@ -5895,7 +5976,7 @@
         <p:spPr>
           <a:xfrm>
             <a:off x="457200" y="274680"/>
-            <a:ext cx="8228880" cy="1142280"/>
+            <a:ext cx="8228160" cy="1141560"/>
           </a:xfrm>
           <a:prstGeom prst="rect">
             <a:avLst/>
@@ -5935,7 +6016,7 @@
         <p:spPr>
           <a:xfrm>
             <a:off x="457200" y="1600200"/>
-            <a:ext cx="8228880" cy="4525200"/>
+            <a:ext cx="8228160" cy="4524480"/>
           </a:xfrm>
           <a:prstGeom prst="rect">
             <a:avLst/>
@@ -5956,7 +6037,7 @@
               <a:buChar char="•"/>
             </a:pPr>
             <a:r>
-              <a:rPr lang="en-US" sz="3200">
+              <a:rPr lang="en-US" sz="2400">
                 <a:solidFill>
                   <a:srgbClr val="ffffff"/>
                 </a:solidFill>
@@ -5975,7 +6056,7 @@
               <a:buChar char="•"/>
             </a:pPr>
             <a:r>
-              <a:rPr lang="en-US" sz="3200">
+              <a:rPr lang="en-US" sz="2400">
                 <a:solidFill>
                   <a:srgbClr val="ffffff"/>
                 </a:solidFill>
@@ -5994,7 +6075,7 @@
               <a:buChar char="–"/>
             </a:pPr>
             <a:r>
-              <a:rPr lang="en-US" sz="2800">
+              <a:rPr lang="en-US" sz="2400">
                 <a:solidFill>
                   <a:srgbClr val="ffffff"/>
                 </a:solidFill>
@@ -6013,7 +6094,7 @@
               <a:buChar char="–"/>
             </a:pPr>
             <a:r>
-              <a:rPr lang="en-US" sz="2800">
+              <a:rPr lang="en-US" sz="2400">
                 <a:solidFill>
                   <a:srgbClr val="ffffff"/>
                 </a:solidFill>
@@ -6032,7 +6113,7 @@
               <a:buChar char="•"/>
             </a:pPr>
             <a:r>
-              <a:rPr lang="en-US" sz="3200">
+              <a:rPr lang="en-US" sz="2400">
                 <a:solidFill>
                   <a:srgbClr val="ffffff"/>
                 </a:solidFill>
@@ -6041,7 +6122,7 @@
               <a:t>Instructions written in a high-level language such as C are called </a:t>
             </a:r>
             <a:r>
-              <a:rPr i="1" lang="en-US" sz="3200">
+              <a:rPr i="1" lang="en-US" sz="2400">
                 <a:solidFill>
                   <a:srgbClr val="ffffff"/>
                 </a:solidFill>
@@ -6050,7 +6131,7 @@
               <a:t>statements</a:t>
             </a:r>
             <a:r>
-              <a:rPr lang="en-US" sz="3200">
+              <a:rPr lang="en-US" sz="2400">
                 <a:solidFill>
                   <a:srgbClr val="ffffff"/>
                 </a:solidFill>
@@ -6059,7 +6140,7 @@
               <a:t> and the program in this form is called </a:t>
             </a:r>
             <a:r>
-              <a:rPr i="1" lang="en-US" sz="3200">
+              <a:rPr i="1" lang="en-US" sz="2400">
                 <a:solidFill>
                   <a:srgbClr val="ffffff"/>
                 </a:solidFill>
@@ -6068,7 +6149,7 @@
               <a:t>source code</a:t>
             </a:r>
             <a:r>
-              <a:rPr lang="en-US" sz="3200">
+              <a:rPr lang="en-US" sz="2400">
                 <a:solidFill>
                   <a:srgbClr val="ffffff"/>
                 </a:solidFill>
@@ -6082,6 +6163,33 @@
       </p:sp>
     </p:spTree>
   </p:cSld>
+  <p:timing>
+    <p:tnLst>
+      <p:par>
+        <p:cTn id="23" dur="indefinite" restart="never" nodeType="tmRoot">
+          <p:childTnLst>
+            <p:seq>
+              <p:cTn id="24" nodeType="mainSeq"/>
+              <p:prevCondLst>
+                <p:cond delay="0" evt="onPrev">
+                  <p:tgtEl>
+                    <p:sldTgt/>
+                  </p:tgtEl>
+                </p:cond>
+              </p:prevCondLst>
+              <p:nextCondLst>
+                <p:cond delay="0" evt="onNext">
+                  <p:tgtEl>
+                    <p:sldTgt/>
+                  </p:tgtEl>
+                </p:cond>
+              </p:nextCondLst>
+            </p:seq>
+          </p:childTnLst>
+        </p:cTn>
+      </p:par>
+    </p:tnLst>
+  </p:timing>
 </p:sld>
 </file>
 
@@ -6111,7 +6219,7 @@
         <p:spPr>
           <a:xfrm>
             <a:off x="457200" y="274680"/>
-            <a:ext cx="8228880" cy="1142280"/>
+            <a:ext cx="8228160" cy="1141560"/>
           </a:xfrm>
           <a:prstGeom prst="rect">
             <a:avLst/>
@@ -6151,7 +6259,7 @@
         <p:spPr>
           <a:xfrm>
             <a:off x="457200" y="1600200"/>
-            <a:ext cx="8228880" cy="4525200"/>
+            <a:ext cx="8228160" cy="4524480"/>
           </a:xfrm>
           <a:prstGeom prst="rect">
             <a:avLst/>
@@ -6172,7 +6280,7 @@
               <a:buChar char="•"/>
             </a:pPr>
             <a:r>
-              <a:rPr lang="en-US" sz="3200">
+              <a:rPr lang="en-US" sz="2400">
                 <a:solidFill>
                   <a:srgbClr val="ffffff"/>
                 </a:solidFill>
@@ -6191,7 +6299,7 @@
               <a:buChar char="•"/>
             </a:pPr>
             <a:r>
-              <a:rPr lang="en-US" sz="3200">
+              <a:rPr lang="en-US" sz="2400">
                 <a:solidFill>
                   <a:srgbClr val="ffffff"/>
                 </a:solidFill>
@@ -6200,7 +6308,7 @@
               <a:t> </a:t>
             </a:r>
             <a:r>
-              <a:rPr lang="en-US" sz="3200">
+              <a:rPr lang="en-US" sz="2400">
                 <a:solidFill>
                   <a:srgbClr val="ffffff"/>
                 </a:solidFill>
@@ -6219,7 +6327,7 @@
               <a:buChar char="–"/>
             </a:pPr>
             <a:r>
-              <a:rPr lang="en-US" sz="2800">
+              <a:rPr lang="en-US" sz="2400">
                 <a:solidFill>
                   <a:srgbClr val="ffffff"/>
                 </a:solidFill>
@@ -6233,6 +6341,33 @@
       </p:sp>
     </p:spTree>
   </p:cSld>
+  <p:timing>
+    <p:tnLst>
+      <p:par>
+        <p:cTn id="25" dur="indefinite" restart="never" nodeType="tmRoot">
+          <p:childTnLst>
+            <p:seq>
+              <p:cTn id="26" nodeType="mainSeq"/>
+              <p:prevCondLst>
+                <p:cond delay="0" evt="onPrev">
+                  <p:tgtEl>
+                    <p:sldTgt/>
+                  </p:tgtEl>
+                </p:cond>
+              </p:prevCondLst>
+              <p:nextCondLst>
+                <p:cond delay="0" evt="onNext">
+                  <p:tgtEl>
+                    <p:sldTgt/>
+                  </p:tgtEl>
+                </p:cond>
+              </p:nextCondLst>
+            </p:seq>
+          </p:childTnLst>
+        </p:cTn>
+      </p:par>
+    </p:tnLst>
+  </p:timing>
 </p:sld>
 </file>
 
@@ -6262,7 +6397,7 @@
         <p:spPr>
           <a:xfrm>
             <a:off x="457200" y="274680"/>
-            <a:ext cx="8228880" cy="1142280"/>
+            <a:ext cx="8228160" cy="1141560"/>
           </a:xfrm>
           <a:prstGeom prst="rect">
             <a:avLst/>
@@ -6302,7 +6437,7 @@
         <p:spPr>
           <a:xfrm>
             <a:off x="457200" y="1676520"/>
-            <a:ext cx="8000280" cy="4647600"/>
+            <a:ext cx="7999560" cy="4646880"/>
           </a:xfrm>
           <a:prstGeom prst="rect">
             <a:avLst/>
@@ -6323,7 +6458,7 @@
               <a:buChar char="•"/>
             </a:pPr>
             <a:r>
-              <a:rPr lang="en-US" sz="3200">
+              <a:rPr lang="en-US" sz="2400">
                 <a:solidFill>
                   <a:srgbClr val="ffffff"/>
                 </a:solidFill>
@@ -6342,7 +6477,7 @@
               <a:buChar char="–"/>
             </a:pPr>
             <a:r>
-              <a:rPr lang="en-US" sz="2800">
+              <a:rPr lang="en-US" sz="2400">
                 <a:solidFill>
                   <a:srgbClr val="ffffff"/>
                 </a:solidFill>
@@ -6361,7 +6496,7 @@
               <a:buChar char="•"/>
             </a:pPr>
             <a:r>
-              <a:rPr lang="en-US" sz="3200">
+              <a:rPr lang="en-US" sz="2400">
                 <a:solidFill>
                   <a:srgbClr val="ffffff"/>
                 </a:solidFill>
@@ -6380,7 +6515,7 @@
               <a:buChar char="•"/>
             </a:pPr>
             <a:r>
-              <a:rPr lang="en-US" sz="3200">
+              <a:rPr lang="en-US" sz="2400">
                 <a:solidFill>
                   <a:srgbClr val="ffffff"/>
                 </a:solidFill>
@@ -6399,7 +6534,7 @@
               <a:buChar char="•"/>
             </a:pPr>
             <a:r>
-              <a:rPr lang="en-US" sz="3200">
+              <a:rPr lang="en-US" sz="2400">
                 <a:solidFill>
                   <a:srgbClr val="ffffff"/>
                 </a:solidFill>
@@ -6413,6 +6548,33 @@
       </p:sp>
     </p:spTree>
   </p:cSld>
+  <p:timing>
+    <p:tnLst>
+      <p:par>
+        <p:cTn id="27" dur="indefinite" restart="never" nodeType="tmRoot">
+          <p:childTnLst>
+            <p:seq>
+              <p:cTn id="28" nodeType="mainSeq"/>
+              <p:prevCondLst>
+                <p:cond delay="0" evt="onPrev">
+                  <p:tgtEl>
+                    <p:sldTgt/>
+                  </p:tgtEl>
+                </p:cond>
+              </p:prevCondLst>
+              <p:nextCondLst>
+                <p:cond delay="0" evt="onNext">
+                  <p:tgtEl>
+                    <p:sldTgt/>
+                  </p:tgtEl>
+                </p:cond>
+              </p:nextCondLst>
+            </p:seq>
+          </p:childTnLst>
+        </p:cTn>
+      </p:par>
+    </p:tnLst>
+  </p:timing>
 </p:sld>
 </file>
 
@@ -6442,7 +6604,7 @@
         <p:spPr>
           <a:xfrm>
             <a:off x="457200" y="274680"/>
-            <a:ext cx="8228880" cy="1142280"/>
+            <a:ext cx="8228160" cy="1141560"/>
           </a:xfrm>
           <a:prstGeom prst="rect">
             <a:avLst/>
@@ -6482,7 +6644,7 @@
         <p:spPr>
           <a:xfrm>
             <a:off x="304920" y="1447920"/>
-            <a:ext cx="8533800" cy="5028480"/>
+            <a:ext cx="8533080" cy="5027760"/>
           </a:xfrm>
           <a:prstGeom prst="rect">
             <a:avLst/>
@@ -6503,7 +6665,7 @@
               <a:buChar char="•"/>
             </a:pPr>
             <a:r>
-              <a:rPr lang="en-US" sz="3200">
+              <a:rPr lang="en-US" sz="2200">
                 <a:solidFill>
                   <a:srgbClr val="ffffff"/>
                 </a:solidFill>
@@ -6522,7 +6684,7 @@
               <a:buChar char="–"/>
             </a:pPr>
             <a:r>
-              <a:rPr lang="en-US" sz="2800">
+              <a:rPr lang="en-US" sz="2200">
                 <a:solidFill>
                   <a:srgbClr val="ffffff"/>
                 </a:solidFill>
@@ -6541,7 +6703,7 @@
               <a:buChar char="•"/>
             </a:pPr>
             <a:r>
-              <a:rPr lang="en-US" sz="3200">
+              <a:rPr lang="en-US" sz="2200">
                 <a:solidFill>
                   <a:srgbClr val="ffffff"/>
                 </a:solidFill>
@@ -6550,7 +6712,7 @@
               <a:t>A major improvement came in the “</a:t>
             </a:r>
             <a:r>
-              <a:rPr i="1" lang="en-US" sz="3200">
+              <a:rPr i="1" lang="en-US" sz="2200">
                 <a:solidFill>
                   <a:srgbClr val="ffffff"/>
                 </a:solidFill>
@@ -6559,7 +6721,7 @@
               <a:t>stored program computer”</a:t>
             </a:r>
             <a:r>
-              <a:rPr lang="en-US" sz="3200">
+              <a:rPr lang="en-US" sz="2200">
                 <a:solidFill>
                   <a:srgbClr val="ffffff"/>
                 </a:solidFill>
@@ -6578,7 +6740,7 @@
               <a:buChar char="–"/>
             </a:pPr>
             <a:r>
-              <a:rPr lang="en-US" sz="2800">
+              <a:rPr lang="en-US" sz="2200">
                 <a:solidFill>
                   <a:srgbClr val="ffffff"/>
                 </a:solidFill>
@@ -6597,7 +6759,7 @@
               <a:buChar char="–"/>
             </a:pPr>
             <a:r>
-              <a:rPr lang="en-US" sz="2800">
+              <a:rPr lang="en-US" sz="2200">
                 <a:solidFill>
                   <a:srgbClr val="ffffff"/>
                 </a:solidFill>
@@ -6611,6 +6773,33 @@
       </p:sp>
     </p:spTree>
   </p:cSld>
+  <p:timing>
+    <p:tnLst>
+      <p:par>
+        <p:cTn id="29" dur="indefinite" restart="never" nodeType="tmRoot">
+          <p:childTnLst>
+            <p:seq>
+              <p:cTn id="30" nodeType="mainSeq"/>
+              <p:prevCondLst>
+                <p:cond delay="0" evt="onPrev">
+                  <p:tgtEl>
+                    <p:sldTgt/>
+                  </p:tgtEl>
+                </p:cond>
+              </p:prevCondLst>
+              <p:nextCondLst>
+                <p:cond delay="0" evt="onNext">
+                  <p:tgtEl>
+                    <p:sldTgt/>
+                  </p:tgtEl>
+                </p:cond>
+              </p:nextCondLst>
+            </p:seq>
+          </p:childTnLst>
+        </p:cTn>
+      </p:par>
+    </p:tnLst>
+  </p:timing>
 </p:sld>
 </file>
 
@@ -6640,7 +6829,7 @@
         <p:spPr>
           <a:xfrm>
             <a:off x="457200" y="274680"/>
-            <a:ext cx="8228880" cy="1142280"/>
+            <a:ext cx="8228160" cy="1141560"/>
           </a:xfrm>
           <a:prstGeom prst="rect">
             <a:avLst/>
@@ -6680,7 +6869,7 @@
         <p:spPr>
           <a:xfrm>
             <a:off x="457200" y="1676520"/>
-            <a:ext cx="8381160" cy="4419000"/>
+            <a:ext cx="8380440" cy="4418280"/>
           </a:xfrm>
           <a:prstGeom prst="rect">
             <a:avLst/>
@@ -6753,6 +6942,33 @@
       </p:sp>
     </p:spTree>
   </p:cSld>
+  <p:timing>
+    <p:tnLst>
+      <p:par>
+        <p:cTn id="31" dur="indefinite" restart="never" nodeType="tmRoot">
+          <p:childTnLst>
+            <p:seq>
+              <p:cTn id="32" nodeType="mainSeq"/>
+              <p:prevCondLst>
+                <p:cond delay="0" evt="onPrev">
+                  <p:tgtEl>
+                    <p:sldTgt/>
+                  </p:tgtEl>
+                </p:cond>
+              </p:prevCondLst>
+              <p:nextCondLst>
+                <p:cond delay="0" evt="onNext">
+                  <p:tgtEl>
+                    <p:sldTgt/>
+                  </p:tgtEl>
+                </p:cond>
+              </p:nextCondLst>
+            </p:seq>
+          </p:childTnLst>
+        </p:cTn>
+      </p:par>
+    </p:tnLst>
+  </p:timing>
 </p:sld>
 </file>
 
@@ -6782,7 +6998,7 @@
         <p:spPr>
           <a:xfrm>
             <a:off x="457200" y="274680"/>
-            <a:ext cx="8381160" cy="1142280"/>
+            <a:ext cx="8380440" cy="1141560"/>
           </a:xfrm>
           <a:prstGeom prst="rect">
             <a:avLst/>
@@ -6822,7 +7038,7 @@
         <p:spPr>
           <a:xfrm>
             <a:off x="685800" y="1523880"/>
-            <a:ext cx="7771680" cy="4799880"/>
+            <a:ext cx="7770960" cy="4799160"/>
           </a:xfrm>
           <a:prstGeom prst="rect">
             <a:avLst/>
@@ -6843,7 +7059,7 @@
               <a:buChar char="•"/>
             </a:pPr>
             <a:r>
-              <a:rPr b="1" lang="en-US" sz="3200">
+              <a:rPr b="1" lang="en-US" sz="2400">
                 <a:solidFill>
                   <a:srgbClr val="ffffff"/>
                 </a:solidFill>
@@ -6852,7 +7068,7 @@
               <a:t>Central Processing Unit </a:t>
             </a:r>
             <a:r>
-              <a:rPr lang="en-US" sz="3200">
+              <a:rPr lang="en-US" sz="2400">
                 <a:solidFill>
                   <a:srgbClr val="ffffff"/>
                 </a:solidFill>
@@ -6871,7 +7087,7 @@
               <a:buChar char="–"/>
             </a:pPr>
             <a:r>
-              <a:rPr lang="en-US" sz="2800">
+              <a:rPr lang="en-US" sz="2400">
                 <a:solidFill>
                   <a:srgbClr val="ffffff"/>
                 </a:solidFill>
@@ -6890,7 +7106,7 @@
               <a:buChar char="–"/>
             </a:pPr>
             <a:r>
-              <a:rPr lang="en-US" sz="2800">
+              <a:rPr lang="en-US" sz="2400">
                 <a:solidFill>
                   <a:srgbClr val="ffffff"/>
                 </a:solidFill>
@@ -6909,7 +7125,7 @@
               <a:buChar char="•"/>
             </a:pPr>
             <a:r>
-              <a:rPr b="1" lang="en-US" sz="3200">
+              <a:rPr b="1" lang="en-US" sz="2400">
                 <a:solidFill>
                   <a:srgbClr val="ffffff"/>
                 </a:solidFill>
@@ -6918,7 +7134,7 @@
               <a:t>Main Memory </a:t>
             </a:r>
             <a:r>
-              <a:rPr lang="en-US" sz="3200">
+              <a:rPr lang="en-US" sz="2400">
                 <a:solidFill>
                   <a:srgbClr val="ffffff"/>
                 </a:solidFill>
@@ -6937,7 +7153,7 @@
               <a:buChar char="–"/>
             </a:pPr>
             <a:r>
-              <a:rPr lang="en-US" sz="2800">
+              <a:rPr lang="en-US" sz="2400">
                 <a:solidFill>
                   <a:srgbClr val="ffffff"/>
                 </a:solidFill>
@@ -6956,7 +7172,7 @@
               <a:buChar char="–"/>
             </a:pPr>
             <a:r>
-              <a:rPr lang="en-US" sz="2800">
+              <a:rPr lang="en-US" sz="2400">
                 <a:solidFill>
                   <a:srgbClr val="ffffff"/>
                 </a:solidFill>
@@ -6975,7 +7191,7 @@
               <a:buChar char="•"/>
             </a:pPr>
             <a:r>
-              <a:rPr b="1" lang="en-US" sz="3200">
+              <a:rPr b="1" lang="en-US" sz="2400">
                 <a:solidFill>
                   <a:srgbClr val="ffffff"/>
                 </a:solidFill>
@@ -6984,7 +7200,7 @@
               <a:t>Graphics Processor </a:t>
             </a:r>
             <a:r>
-              <a:rPr lang="en-US" sz="3200">
+              <a:rPr lang="en-US" sz="2400">
                 <a:solidFill>
                   <a:srgbClr val="ffffff"/>
                 </a:solidFill>
@@ -7003,7 +7219,7 @@
               <a:buChar char="–"/>
             </a:pPr>
             <a:r>
-              <a:rPr lang="en-US" sz="2800">
+              <a:rPr lang="en-US" sz="2400">
                 <a:solidFill>
                   <a:srgbClr val="ffffff"/>
                 </a:solidFill>
@@ -7022,7 +7238,7 @@
               <a:buChar char="–"/>
             </a:pPr>
             <a:r>
-              <a:rPr lang="en-US" sz="2800">
+              <a:rPr lang="en-US" sz="2400">
                 <a:solidFill>
                   <a:srgbClr val="ffffff"/>
                 </a:solidFill>
@@ -7036,6 +7252,33 @@
       </p:sp>
     </p:spTree>
   </p:cSld>
+  <p:timing>
+    <p:tnLst>
+      <p:par>
+        <p:cTn id="33" dur="indefinite" restart="never" nodeType="tmRoot">
+          <p:childTnLst>
+            <p:seq>
+              <p:cTn id="34" nodeType="mainSeq"/>
+              <p:prevCondLst>
+                <p:cond delay="0" evt="onPrev">
+                  <p:tgtEl>
+                    <p:sldTgt/>
+                  </p:tgtEl>
+                </p:cond>
+              </p:prevCondLst>
+              <p:nextCondLst>
+                <p:cond delay="0" evt="onNext">
+                  <p:tgtEl>
+                    <p:sldTgt/>
+                  </p:tgtEl>
+                </p:cond>
+              </p:nextCondLst>
+            </p:seq>
+          </p:childTnLst>
+        </p:cTn>
+      </p:par>
+    </p:tnLst>
+  </p:timing>
 </p:sld>
 </file>
 
@@ -7065,7 +7308,7 @@
         <p:spPr>
           <a:xfrm>
             <a:off x="457200" y="274680"/>
-            <a:ext cx="8381160" cy="1142280"/>
+            <a:ext cx="8380440" cy="1141560"/>
           </a:xfrm>
           <a:prstGeom prst="rect">
             <a:avLst/>
@@ -7105,7 +7348,7 @@
         <p:spPr>
           <a:xfrm>
             <a:off x="304920" y="1447920"/>
-            <a:ext cx="8457480" cy="5028480"/>
+            <a:ext cx="8456760" cy="5027760"/>
           </a:xfrm>
           <a:prstGeom prst="rect">
             <a:avLst/>
@@ -7126,7 +7369,7 @@
               <a:buChar char="•"/>
             </a:pPr>
             <a:r>
-              <a:rPr b="1" lang="en-US" sz="3200">
+              <a:rPr b="1" lang="en-US" sz="2400">
                 <a:solidFill>
                   <a:srgbClr val="ffffff"/>
                 </a:solidFill>
@@ -7145,7 +7388,7 @@
               <a:buChar char="–"/>
             </a:pPr>
             <a:r>
-              <a:rPr lang="en-US" sz="2800">
+              <a:rPr lang="en-US" sz="2400">
                 <a:solidFill>
                   <a:srgbClr val="ffffff"/>
                 </a:solidFill>
@@ -7164,7 +7407,7 @@
               <a:buChar char="–"/>
             </a:pPr>
             <a:r>
-              <a:rPr lang="en-US" sz="2800">
+              <a:rPr lang="en-US" sz="2400">
                 <a:solidFill>
                   <a:srgbClr val="ffffff"/>
                 </a:solidFill>
@@ -7183,7 +7426,7 @@
               <a:buChar char="•"/>
             </a:pPr>
             <a:r>
-              <a:rPr b="1" lang="en-US" sz="3200">
+              <a:rPr b="1" lang="en-US" sz="2400">
                 <a:solidFill>
                   <a:srgbClr val="ffffff"/>
                 </a:solidFill>
@@ -7202,7 +7445,7 @@
               <a:buChar char="–"/>
             </a:pPr>
             <a:r>
-              <a:rPr lang="en-US" sz="2800">
+              <a:rPr lang="en-US" sz="2400">
                 <a:solidFill>
                   <a:srgbClr val="ffffff"/>
                 </a:solidFill>
@@ -7221,7 +7464,7 @@
               <a:buChar char="–"/>
             </a:pPr>
             <a:r>
-              <a:rPr lang="en-US" sz="2800">
+              <a:rPr lang="en-US" sz="2400">
                 <a:solidFill>
                   <a:srgbClr val="ffffff"/>
                 </a:solidFill>
@@ -7230,7 +7473,7 @@
               <a:t> </a:t>
             </a:r>
             <a:r>
-              <a:rPr lang="en-US" sz="2800">
+              <a:rPr lang="en-US" sz="2400">
                 <a:solidFill>
                   <a:srgbClr val="ffffff"/>
                 </a:solidFill>
@@ -7249,7 +7492,7 @@
               <a:buChar char="•"/>
             </a:pPr>
             <a:r>
-              <a:rPr b="1" lang="en-US" sz="3200">
+              <a:rPr b="1" lang="en-US" sz="2400">
                 <a:solidFill>
                   <a:srgbClr val="ffffff"/>
                 </a:solidFill>
@@ -7258,7 +7501,7 @@
               <a:t>Arithmetic Unit </a:t>
             </a:r>
             <a:r>
-              <a:rPr lang="en-US" sz="3200">
+              <a:rPr lang="en-US" sz="2400">
                 <a:solidFill>
                   <a:srgbClr val="ffffff"/>
                 </a:solidFill>
@@ -7277,7 +7520,7 @@
               <a:buChar char="–"/>
             </a:pPr>
             <a:r>
-              <a:rPr lang="en-US" sz="2800">
+              <a:rPr lang="en-US" sz="2400">
                 <a:solidFill>
                   <a:srgbClr val="ffffff"/>
                 </a:solidFill>
@@ -7296,7 +7539,7 @@
               <a:buChar char="–"/>
             </a:pPr>
             <a:r>
-              <a:rPr lang="en-US" sz="2800">
+              <a:rPr lang="en-US" sz="2400">
                 <a:solidFill>
                   <a:srgbClr val="ffffff"/>
                 </a:solidFill>
@@ -7310,6 +7553,33 @@
       </p:sp>
     </p:spTree>
   </p:cSld>
+  <p:timing>
+    <p:tnLst>
+      <p:par>
+        <p:cTn id="35" dur="indefinite" restart="never" nodeType="tmRoot">
+          <p:childTnLst>
+            <p:seq>
+              <p:cTn id="36" nodeType="mainSeq"/>
+              <p:prevCondLst>
+                <p:cond delay="0" evt="onPrev">
+                  <p:tgtEl>
+                    <p:sldTgt/>
+                  </p:tgtEl>
+                </p:cond>
+              </p:prevCondLst>
+              <p:nextCondLst>
+                <p:cond delay="0" evt="onNext">
+                  <p:tgtEl>
+                    <p:sldTgt/>
+                  </p:tgtEl>
+                </p:cond>
+              </p:nextCondLst>
+            </p:seq>
+          </p:childTnLst>
+        </p:cTn>
+      </p:par>
+    </p:tnLst>
+  </p:timing>
 </p:sld>
 </file>
 
@@ -7339,7 +7609,7 @@
         <p:spPr>
           <a:xfrm>
             <a:off x="457200" y="274680"/>
-            <a:ext cx="8305200" cy="1142280"/>
+            <a:ext cx="8304480" cy="1141560"/>
           </a:xfrm>
           <a:prstGeom prst="rect">
             <a:avLst/>
@@ -7379,7 +7649,7 @@
         <p:spPr>
           <a:xfrm>
             <a:off x="457200" y="1600200"/>
-            <a:ext cx="8228880" cy="4525200"/>
+            <a:ext cx="8228160" cy="4524480"/>
           </a:xfrm>
           <a:prstGeom prst="rect">
             <a:avLst/>
@@ -7400,7 +7670,7 @@
               <a:buChar char="•"/>
             </a:pPr>
             <a:r>
-              <a:rPr b="1" lang="en-US" sz="3200">
+              <a:rPr b="1" lang="en-US" sz="2400">
                 <a:solidFill>
                   <a:srgbClr val="ffffff"/>
                 </a:solidFill>
@@ -7409,7 +7679,7 @@
               <a:t>Operating System</a:t>
             </a:r>
             <a:r>
-              <a:rPr lang="en-US" sz="3200">
+              <a:rPr lang="en-US" sz="2400">
                 <a:solidFill>
                   <a:srgbClr val="ffffff"/>
                 </a:solidFill>
@@ -7428,7 +7698,7 @@
               <a:buChar char="–"/>
             </a:pPr>
             <a:r>
-              <a:rPr lang="en-US" sz="2600">
+              <a:rPr lang="en-US" sz="2400">
                 <a:solidFill>
                   <a:srgbClr val="ffffff"/>
                 </a:solidFill>
@@ -7447,7 +7717,7 @@
               <a:buChar char="–"/>
             </a:pPr>
             <a:r>
-              <a:rPr lang="en-US" sz="2600">
+              <a:rPr lang="en-US" sz="2400">
                 <a:solidFill>
                   <a:srgbClr val="ffffff"/>
                 </a:solidFill>
@@ -7466,7 +7736,7 @@
               <a:buChar char="–"/>
             </a:pPr>
             <a:r>
-              <a:rPr lang="en-US" sz="2600">
+              <a:rPr lang="en-US" sz="2400">
                 <a:solidFill>
                   <a:srgbClr val="ffffff"/>
                 </a:solidFill>
@@ -7485,7 +7755,7 @@
               <a:buChar char="•"/>
             </a:pPr>
             <a:r>
-              <a:rPr b="1" lang="en-US" sz="3200">
+              <a:rPr b="1" lang="en-US" sz="2400">
                 <a:solidFill>
                   <a:srgbClr val="ffffff"/>
                 </a:solidFill>
@@ -7504,7 +7774,7 @@
               <a:buChar char="–"/>
             </a:pPr>
             <a:r>
-              <a:rPr lang="en-US" sz="2600">
+              <a:rPr lang="en-US" sz="2400">
                 <a:solidFill>
                   <a:srgbClr val="ffffff"/>
                 </a:solidFill>
@@ -7523,7 +7793,7 @@
               <a:buChar char="•"/>
             </a:pPr>
             <a:r>
-              <a:rPr b="1" lang="en-US" sz="3200">
+              <a:rPr b="1" lang="en-US" sz="2400">
                 <a:solidFill>
                   <a:srgbClr val="ffffff"/>
                 </a:solidFill>
@@ -7542,7 +7812,7 @@
               <a:buChar char="–"/>
             </a:pPr>
             <a:r>
-              <a:rPr lang="en-US" sz="2600">
+              <a:rPr lang="en-US" sz="2400">
                 <a:solidFill>
                   <a:srgbClr val="ffffff"/>
                 </a:solidFill>
@@ -7561,7 +7831,7 @@
               <a:buChar char="–"/>
             </a:pPr>
             <a:r>
-              <a:rPr lang="en-US" sz="2600">
+              <a:rPr lang="en-US" sz="2400">
                 <a:solidFill>
                   <a:srgbClr val="ffffff"/>
                 </a:solidFill>
@@ -7575,6 +7845,33 @@
       </p:sp>
     </p:spTree>
   </p:cSld>
+  <p:timing>
+    <p:tnLst>
+      <p:par>
+        <p:cTn id="37" dur="indefinite" restart="never" nodeType="tmRoot">
+          <p:childTnLst>
+            <p:seq>
+              <p:cTn id="38" nodeType="mainSeq"/>
+              <p:prevCondLst>
+                <p:cond delay="0" evt="onPrev">
+                  <p:tgtEl>
+                    <p:sldTgt/>
+                  </p:tgtEl>
+                </p:cond>
+              </p:prevCondLst>
+              <p:nextCondLst>
+                <p:cond delay="0" evt="onNext">
+                  <p:tgtEl>
+                    <p:sldTgt/>
+                  </p:tgtEl>
+                </p:cond>
+              </p:nextCondLst>
+            </p:seq>
+          </p:childTnLst>
+        </p:cTn>
+      </p:par>
+    </p:tnLst>
+  </p:timing>
 </p:sld>
 </file>
 
@@ -7604,7 +7901,7 @@
         <p:spPr>
           <a:xfrm>
             <a:off x="457200" y="274680"/>
-            <a:ext cx="8228880" cy="1142280"/>
+            <a:ext cx="8228160" cy="1141560"/>
           </a:xfrm>
           <a:prstGeom prst="rect">
             <a:avLst/>
@@ -7644,7 +7941,7 @@
         <p:spPr>
           <a:xfrm>
             <a:off x="685800" y="1676520"/>
-            <a:ext cx="7771680" cy="4190400"/>
+            <a:ext cx="7770960" cy="4189680"/>
           </a:xfrm>
           <a:prstGeom prst="rect">
             <a:avLst/>
@@ -7665,7 +7962,7 @@
               <a:buChar char="•"/>
             </a:pPr>
             <a:r>
-              <a:rPr lang="en-US" sz="3200">
+              <a:rPr lang="en-US" sz="2800">
                 <a:solidFill>
                   <a:srgbClr val="ffffff"/>
                 </a:solidFill>
@@ -7684,7 +7981,7 @@
               <a:buChar char="•"/>
             </a:pPr>
             <a:r>
-              <a:rPr lang="en-US" sz="3200">
+              <a:rPr lang="en-US" sz="2800">
                 <a:solidFill>
                   <a:srgbClr val="ffffff"/>
                 </a:solidFill>
@@ -7741,7 +8038,7 @@
               <a:buChar char="•"/>
             </a:pPr>
             <a:r>
-              <a:rPr lang="en-US" sz="3200">
+              <a:rPr lang="en-US" sz="2800">
                 <a:solidFill>
                   <a:srgbClr val="ffffff"/>
                 </a:solidFill>
@@ -7760,7 +8057,7 @@
               <a:buChar char="•"/>
             </a:pPr>
             <a:r>
-              <a:rPr lang="en-US" sz="3200">
+              <a:rPr lang="en-US" sz="2800">
                 <a:solidFill>
                   <a:srgbClr val="ffffff"/>
                 </a:solidFill>
@@ -7774,6 +8071,33 @@
       </p:sp>
     </p:spTree>
   </p:cSld>
+  <p:timing>
+    <p:tnLst>
+      <p:par>
+        <p:cTn id="3" dur="indefinite" restart="never" nodeType="tmRoot">
+          <p:childTnLst>
+            <p:seq>
+              <p:cTn id="4" nodeType="mainSeq"/>
+              <p:prevCondLst>
+                <p:cond delay="0" evt="onPrev">
+                  <p:tgtEl>
+                    <p:sldTgt/>
+                  </p:tgtEl>
+                </p:cond>
+              </p:prevCondLst>
+              <p:nextCondLst>
+                <p:cond delay="0" evt="onNext">
+                  <p:tgtEl>
+                    <p:sldTgt/>
+                  </p:tgtEl>
+                </p:cond>
+              </p:nextCondLst>
+            </p:seq>
+          </p:childTnLst>
+        </p:cTn>
+      </p:par>
+    </p:tnLst>
+  </p:timing>
 </p:sld>
 </file>
 
@@ -7803,7 +8127,7 @@
         <p:spPr>
           <a:xfrm>
             <a:off x="457200" y="274680"/>
-            <a:ext cx="8228880" cy="1142280"/>
+            <a:ext cx="8228160" cy="1141560"/>
           </a:xfrm>
           <a:prstGeom prst="rect">
             <a:avLst/>
@@ -7843,7 +8167,7 @@
         <p:spPr>
           <a:xfrm>
             <a:off x="457200" y="1600200"/>
-            <a:ext cx="8228880" cy="4525200"/>
+            <a:ext cx="8228160" cy="4524480"/>
           </a:xfrm>
           <a:prstGeom prst="rect">
             <a:avLst/>
@@ -7864,7 +8188,7 @@
               <a:buChar char="•"/>
             </a:pPr>
             <a:r>
-              <a:rPr lang="en-US" sz="2800">
+              <a:rPr lang="en-US" sz="2400">
                 <a:solidFill>
                   <a:srgbClr val="ffffff"/>
                 </a:solidFill>
@@ -7883,7 +8207,7 @@
               <a:buChar char="•"/>
             </a:pPr>
             <a:r>
-              <a:rPr lang="en-US" sz="2800">
+              <a:rPr lang="en-US" sz="2400">
                 <a:solidFill>
                   <a:srgbClr val="ffffff"/>
                 </a:solidFill>
@@ -7902,7 +8226,7 @@
               <a:buChar char="•"/>
             </a:pPr>
             <a:r>
-              <a:rPr lang="en-US" sz="2800">
+              <a:rPr lang="en-US" sz="2400">
                 <a:solidFill>
                   <a:srgbClr val="ffffff"/>
                 </a:solidFill>
@@ -7921,7 +8245,7 @@
               <a:buChar char="•"/>
             </a:pPr>
             <a:r>
-              <a:rPr lang="en-US" sz="2800">
+              <a:rPr lang="en-US" sz="2400">
                 <a:solidFill>
                   <a:srgbClr val="ffffff"/>
                 </a:solidFill>
@@ -7935,6 +8259,33 @@
       </p:sp>
     </p:spTree>
   </p:cSld>
+  <p:timing>
+    <p:tnLst>
+      <p:par>
+        <p:cTn id="39" dur="indefinite" restart="never" nodeType="tmRoot">
+          <p:childTnLst>
+            <p:seq>
+              <p:cTn id="40" nodeType="mainSeq"/>
+              <p:prevCondLst>
+                <p:cond delay="0" evt="onPrev">
+                  <p:tgtEl>
+                    <p:sldTgt/>
+                  </p:tgtEl>
+                </p:cond>
+              </p:prevCondLst>
+              <p:nextCondLst>
+                <p:cond delay="0" evt="onNext">
+                  <p:tgtEl>
+                    <p:sldTgt/>
+                  </p:tgtEl>
+                </p:cond>
+              </p:nextCondLst>
+            </p:seq>
+          </p:childTnLst>
+        </p:cTn>
+      </p:par>
+    </p:tnLst>
+  </p:timing>
 </p:sld>
 </file>
 
@@ -7964,7 +8315,7 @@
         <p:spPr>
           <a:xfrm>
             <a:off x="457200" y="274680"/>
-            <a:ext cx="8228880" cy="1142280"/>
+            <a:ext cx="8228160" cy="1141560"/>
           </a:xfrm>
           <a:prstGeom prst="rect">
             <a:avLst/>
@@ -8004,7 +8355,7 @@
         <p:spPr>
           <a:xfrm>
             <a:off x="457200" y="1676520"/>
-            <a:ext cx="8228880" cy="4419000"/>
+            <a:ext cx="8228160" cy="4418280"/>
           </a:xfrm>
           <a:prstGeom prst="rect">
             <a:avLst/>
@@ -8025,7 +8376,7 @@
               <a:buChar char="•"/>
             </a:pPr>
             <a:r>
-              <a:rPr lang="en-US" sz="3200">
+              <a:rPr lang="en-US" sz="2200">
                 <a:solidFill>
                   <a:srgbClr val="ffffff"/>
                 </a:solidFill>
@@ -8044,7 +8395,7 @@
               <a:buChar char="–"/>
             </a:pPr>
             <a:r>
-              <a:rPr lang="en-US" sz="2800">
+              <a:rPr lang="en-US" sz="2200">
                 <a:solidFill>
                   <a:srgbClr val="ffffff"/>
                 </a:solidFill>
@@ -8063,7 +8414,7 @@
               <a:buChar char="–"/>
             </a:pPr>
             <a:r>
-              <a:rPr lang="en-US" sz="2800">
+              <a:rPr lang="en-US" sz="2200">
                 <a:solidFill>
                   <a:srgbClr val="ffffff"/>
                 </a:solidFill>
@@ -8072,7 +8423,7 @@
               <a:t>… </a:t>
             </a:r>
             <a:r>
-              <a:rPr lang="en-US" sz="2800">
+              <a:rPr lang="en-US" sz="2200">
                 <a:solidFill>
                   <a:srgbClr val="ffffff"/>
                 </a:solidFill>
@@ -8091,7 +8442,7 @@
               <a:buChar char="–"/>
             </a:pPr>
             <a:r>
-              <a:rPr lang="en-US" sz="2800">
+              <a:rPr lang="en-US" sz="2200">
                 <a:solidFill>
                   <a:srgbClr val="ffffff"/>
                 </a:solidFill>
@@ -8100,7 +8451,7 @@
               <a:t>… </a:t>
             </a:r>
             <a:r>
-              <a:rPr lang="en-US" sz="2800">
+              <a:rPr lang="en-US" sz="2200">
                 <a:solidFill>
                   <a:srgbClr val="ffffff"/>
                 </a:solidFill>
@@ -8119,7 +8470,7 @@
               <a:buChar char="–"/>
             </a:pPr>
             <a:r>
-              <a:rPr lang="en-US" sz="2800">
+              <a:rPr lang="en-US" sz="2200">
                 <a:solidFill>
                   <a:srgbClr val="ffffff"/>
                 </a:solidFill>
@@ -8128,7 +8479,7 @@
               <a:t>… </a:t>
             </a:r>
             <a:r>
-              <a:rPr lang="en-US" sz="2800">
+              <a:rPr lang="en-US" sz="2200">
                 <a:solidFill>
                   <a:srgbClr val="ffffff"/>
                 </a:solidFill>
@@ -8147,7 +8498,7 @@
               <a:buChar char="–"/>
             </a:pPr>
             <a:r>
-              <a:rPr lang="en-US" sz="2800">
+              <a:rPr lang="en-US" sz="2200">
                 <a:solidFill>
                   <a:srgbClr val="ffffff"/>
                 </a:solidFill>
@@ -8156,7 +8507,7 @@
               <a:t>… </a:t>
             </a:r>
             <a:r>
-              <a:rPr lang="en-US" sz="2800">
+              <a:rPr lang="en-US" sz="2200">
                 <a:solidFill>
                   <a:srgbClr val="ffffff"/>
                 </a:solidFill>
@@ -8175,7 +8526,7 @@
               <a:buChar char="•"/>
             </a:pPr>
             <a:r>
-              <a:rPr lang="en-US" sz="3200">
+              <a:rPr lang="en-US" sz="2200">
                 <a:solidFill>
                   <a:srgbClr val="ffffff"/>
                 </a:solidFill>
@@ -8194,7 +8545,7 @@
               <a:buChar char="•"/>
             </a:pPr>
             <a:r>
-              <a:rPr lang="en-US" sz="3200">
+              <a:rPr lang="en-US" sz="2200">
                 <a:solidFill>
                   <a:srgbClr val="ffffff"/>
                 </a:solidFill>
@@ -8208,6 +8559,33 @@
       </p:sp>
     </p:spTree>
   </p:cSld>
+  <p:timing>
+    <p:tnLst>
+      <p:par>
+        <p:cTn id="41" dur="indefinite" restart="never" nodeType="tmRoot">
+          <p:childTnLst>
+            <p:seq>
+              <p:cTn id="42" nodeType="mainSeq"/>
+              <p:prevCondLst>
+                <p:cond delay="0" evt="onPrev">
+                  <p:tgtEl>
+                    <p:sldTgt/>
+                  </p:tgtEl>
+                </p:cond>
+              </p:prevCondLst>
+              <p:nextCondLst>
+                <p:cond delay="0" evt="onNext">
+                  <p:tgtEl>
+                    <p:sldTgt/>
+                  </p:tgtEl>
+                </p:cond>
+              </p:nextCondLst>
+            </p:seq>
+          </p:childTnLst>
+        </p:cTn>
+      </p:par>
+    </p:tnLst>
+  </p:timing>
 </p:sld>
 </file>
 
@@ -8237,7 +8615,7 @@
         <p:spPr>
           <a:xfrm>
             <a:off x="457200" y="274680"/>
-            <a:ext cx="8228880" cy="1142280"/>
+            <a:ext cx="8228160" cy="1141560"/>
           </a:xfrm>
           <a:prstGeom prst="rect">
             <a:avLst/>
@@ -8277,7 +8655,7 @@
         <p:spPr>
           <a:xfrm>
             <a:off x="457200" y="1600200"/>
-            <a:ext cx="8228880" cy="4525200"/>
+            <a:ext cx="8228160" cy="4524480"/>
           </a:xfrm>
           <a:prstGeom prst="rect">
             <a:avLst/>
@@ -8298,7 +8676,7 @@
               <a:buAutoNum type="arabicParenR"/>
             </a:pPr>
             <a:r>
-              <a:rPr lang="en-US" sz="2800">
+              <a:rPr lang="en-US" sz="2200">
                 <a:solidFill>
                   <a:srgbClr val="ffffff"/>
                 </a:solidFill>
@@ -8317,7 +8695,7 @@
               <a:buAutoNum type="arabicParenR"/>
             </a:pPr>
             <a:r>
-              <a:rPr lang="en-US" sz="2800">
+              <a:rPr lang="en-US" sz="2200">
                 <a:solidFill>
                   <a:srgbClr val="ffffff"/>
                 </a:solidFill>
@@ -8336,7 +8714,7 @@
               <a:buAutoNum type="arabicParenR"/>
             </a:pPr>
             <a:r>
-              <a:rPr lang="en-US" sz="2400">
+              <a:rPr lang="en-US" sz="2200">
                 <a:solidFill>
                   <a:srgbClr val="ffffff"/>
                 </a:solidFill>
@@ -8355,7 +8733,7 @@
               <a:buAutoNum type="arabicParenR"/>
             </a:pPr>
             <a:r>
-              <a:rPr lang="en-US" sz="2800">
+              <a:rPr lang="en-US" sz="2200">
                 <a:solidFill>
                   <a:srgbClr val="ffffff"/>
                 </a:solidFill>
@@ -8374,7 +8752,7 @@
               <a:buAutoNum type="arabicParenR"/>
             </a:pPr>
             <a:r>
-              <a:rPr lang="en-US" sz="2800">
+              <a:rPr lang="en-US" sz="2200">
                 <a:solidFill>
                   <a:srgbClr val="ffffff"/>
                 </a:solidFill>
@@ -8393,7 +8771,7 @@
               <a:buAutoNum type="arabicParenR"/>
             </a:pPr>
             <a:r>
-              <a:rPr lang="en-US" sz="2800">
+              <a:rPr lang="en-US" sz="2200">
                 <a:solidFill>
                   <a:srgbClr val="ffffff"/>
                 </a:solidFill>
@@ -8412,7 +8790,7 @@
               <a:buAutoNum type="arabicParenR"/>
             </a:pPr>
             <a:r>
-              <a:rPr lang="en-US" sz="2800">
+              <a:rPr lang="en-US" sz="2200">
                 <a:solidFill>
                   <a:srgbClr val="ffffff"/>
                 </a:solidFill>
@@ -8431,7 +8809,7 @@
               <a:buAutoNum type="arabicPeriod"/>
             </a:pPr>
             <a:r>
-              <a:rPr lang="en-US" sz="2000">
+              <a:rPr lang="en-US" sz="2200">
                 <a:solidFill>
                   <a:srgbClr val="ffffff"/>
                 </a:solidFill>
@@ -8450,7 +8828,7 @@
               <a:buAutoNum type="arabicPeriod"/>
             </a:pPr>
             <a:r>
-              <a:rPr lang="en-US" sz="2000">
+              <a:rPr lang="en-US" sz="2200">
                 <a:solidFill>
                   <a:srgbClr val="ffffff"/>
                 </a:solidFill>
@@ -8459,7 +8837,7 @@
               <a:t> </a:t>
             </a:r>
             <a:r>
-              <a:rPr lang="en-US" sz="2000">
+              <a:rPr lang="en-US" sz="2200">
                 <a:solidFill>
                   <a:srgbClr val="ffffff"/>
                 </a:solidFill>
@@ -8473,6 +8851,33 @@
       </p:sp>
     </p:spTree>
   </p:cSld>
+  <p:timing>
+    <p:tnLst>
+      <p:par>
+        <p:cTn id="43" dur="indefinite" restart="never" nodeType="tmRoot">
+          <p:childTnLst>
+            <p:seq>
+              <p:cTn id="44" nodeType="mainSeq"/>
+              <p:prevCondLst>
+                <p:cond delay="0" evt="onPrev">
+                  <p:tgtEl>
+                    <p:sldTgt/>
+                  </p:tgtEl>
+                </p:cond>
+              </p:prevCondLst>
+              <p:nextCondLst>
+                <p:cond delay="0" evt="onNext">
+                  <p:tgtEl>
+                    <p:sldTgt/>
+                  </p:tgtEl>
+                </p:cond>
+              </p:nextCondLst>
+            </p:seq>
+          </p:childTnLst>
+        </p:cTn>
+      </p:par>
+    </p:tnLst>
+  </p:timing>
 </p:sld>
 </file>
 
@@ -8502,7 +8907,7 @@
         <p:spPr>
           <a:xfrm>
             <a:off x="457200" y="274680"/>
-            <a:ext cx="8228880" cy="1142280"/>
+            <a:ext cx="8228160" cy="1141560"/>
           </a:xfrm>
           <a:prstGeom prst="rect">
             <a:avLst/>
@@ -8542,7 +8947,7 @@
         <p:spPr>
           <a:xfrm>
             <a:off x="457200" y="1600200"/>
-            <a:ext cx="8228880" cy="4525200"/>
+            <a:ext cx="8228160" cy="4524480"/>
           </a:xfrm>
           <a:prstGeom prst="rect">
             <a:avLst/>
@@ -8563,7 +8968,7 @@
               <a:buChar char="•"/>
             </a:pPr>
             <a:r>
-              <a:rPr lang="en-US" sz="3200">
+              <a:rPr lang="en-US" sz="2600">
                 <a:solidFill>
                   <a:srgbClr val="ffffff"/>
                 </a:solidFill>
@@ -8582,7 +8987,7 @@
               <a:buChar char="•"/>
             </a:pPr>
             <a:r>
-              <a:rPr lang="en-US" sz="3200">
+              <a:rPr lang="en-US" sz="2600">
                 <a:solidFill>
                   <a:srgbClr val="ffffff"/>
                 </a:solidFill>
@@ -8601,7 +9006,7 @@
               <a:buChar char="•"/>
             </a:pPr>
             <a:r>
-              <a:rPr lang="en-US" sz="3200">
+              <a:rPr lang="en-US" sz="2600">
                 <a:solidFill>
                   <a:srgbClr val="ffffff"/>
                 </a:solidFill>
@@ -8620,7 +9025,7 @@
               <a:buChar char="•"/>
             </a:pPr>
             <a:r>
-              <a:rPr lang="en-US" sz="3200">
+              <a:rPr lang="en-US" sz="2600">
                 <a:solidFill>
                   <a:srgbClr val="ffffff"/>
                 </a:solidFill>
@@ -8634,6 +9039,33 @@
       </p:sp>
     </p:spTree>
   </p:cSld>
+  <p:timing>
+    <p:tnLst>
+      <p:par>
+        <p:cTn id="45" dur="indefinite" restart="never" nodeType="tmRoot">
+          <p:childTnLst>
+            <p:seq>
+              <p:cTn id="46" nodeType="mainSeq"/>
+              <p:prevCondLst>
+                <p:cond delay="0" evt="onPrev">
+                  <p:tgtEl>
+                    <p:sldTgt/>
+                  </p:tgtEl>
+                </p:cond>
+              </p:prevCondLst>
+              <p:nextCondLst>
+                <p:cond delay="0" evt="onNext">
+                  <p:tgtEl>
+                    <p:sldTgt/>
+                  </p:tgtEl>
+                </p:cond>
+              </p:nextCondLst>
+            </p:seq>
+          </p:childTnLst>
+        </p:cTn>
+      </p:par>
+    </p:tnLst>
+  </p:timing>
 </p:sld>
 </file>
 
@@ -8663,7 +9095,7 @@
         <p:spPr>
           <a:xfrm>
             <a:off x="457200" y="274680"/>
-            <a:ext cx="8228880" cy="1142280"/>
+            <a:ext cx="8228160" cy="1141560"/>
           </a:xfrm>
           <a:prstGeom prst="rect">
             <a:avLst/>
@@ -8703,7 +9135,7 @@
         <p:spPr>
           <a:xfrm>
             <a:off x="457200" y="1600200"/>
-            <a:ext cx="8228880" cy="4525200"/>
+            <a:ext cx="8228160" cy="4524480"/>
           </a:xfrm>
           <a:prstGeom prst="rect">
             <a:avLst/>
@@ -8861,6 +9293,33 @@
       </p:sp>
     </p:spTree>
   </p:cSld>
+  <p:timing>
+    <p:tnLst>
+      <p:par>
+        <p:cTn id="47" dur="indefinite" restart="never" nodeType="tmRoot">
+          <p:childTnLst>
+            <p:seq>
+              <p:cTn id="48" nodeType="mainSeq"/>
+              <p:prevCondLst>
+                <p:cond delay="0" evt="onPrev">
+                  <p:tgtEl>
+                    <p:sldTgt/>
+                  </p:tgtEl>
+                </p:cond>
+              </p:prevCondLst>
+              <p:nextCondLst>
+                <p:cond delay="0" evt="onNext">
+                  <p:tgtEl>
+                    <p:sldTgt/>
+                  </p:tgtEl>
+                </p:cond>
+              </p:nextCondLst>
+            </p:seq>
+          </p:childTnLst>
+        </p:cTn>
+      </p:par>
+    </p:tnLst>
+  </p:timing>
 </p:sld>
 </file>
 
@@ -8890,7 +9349,7 @@
         <p:spPr>
           <a:xfrm>
             <a:off x="457200" y="274680"/>
-            <a:ext cx="8228880" cy="1142280"/>
+            <a:ext cx="8228160" cy="1141560"/>
           </a:xfrm>
           <a:prstGeom prst="rect">
             <a:avLst/>
@@ -8930,7 +9389,7 @@
         <p:spPr>
           <a:xfrm>
             <a:off x="457200" y="1600200"/>
-            <a:ext cx="8228880" cy="4525200"/>
+            <a:ext cx="8228160" cy="4524480"/>
           </a:xfrm>
           <a:prstGeom prst="rect">
             <a:avLst/>
@@ -8984,6 +9443,33 @@
       </p:sp>
     </p:spTree>
   </p:cSld>
+  <p:timing>
+    <p:tnLst>
+      <p:par>
+        <p:cTn id="49" dur="indefinite" restart="never" nodeType="tmRoot">
+          <p:childTnLst>
+            <p:seq>
+              <p:cTn id="50" nodeType="mainSeq"/>
+              <p:prevCondLst>
+                <p:cond delay="0" evt="onPrev">
+                  <p:tgtEl>
+                    <p:sldTgt/>
+                  </p:tgtEl>
+                </p:cond>
+              </p:prevCondLst>
+              <p:nextCondLst>
+                <p:cond delay="0" evt="onNext">
+                  <p:tgtEl>
+                    <p:sldTgt/>
+                  </p:tgtEl>
+                </p:cond>
+              </p:nextCondLst>
+            </p:seq>
+          </p:childTnLst>
+        </p:cTn>
+      </p:par>
+    </p:tnLst>
+  </p:timing>
 </p:sld>
 </file>
 
@@ -9013,7 +9499,7 @@
         <p:spPr>
           <a:xfrm>
             <a:off x="457200" y="274680"/>
-            <a:ext cx="8228880" cy="1142280"/>
+            <a:ext cx="8228160" cy="1141560"/>
           </a:xfrm>
           <a:prstGeom prst="rect">
             <a:avLst/>
@@ -9053,7 +9539,7 @@
         <p:spPr>
           <a:xfrm>
             <a:off x="457200" y="1600200"/>
-            <a:ext cx="8228880" cy="4525200"/>
+            <a:ext cx="8228160" cy="4524480"/>
           </a:xfrm>
           <a:prstGeom prst="rect">
             <a:avLst/>
@@ -9101,7 +9587,7 @@
         <p:spPr>
           <a:xfrm>
             <a:off x="3733920" y="2762280"/>
-            <a:ext cx="1980360" cy="2742480"/>
+            <a:ext cx="1979640" cy="2741760"/>
           </a:xfrm>
           <a:prstGeom prst="rect">
             <a:avLst/>
@@ -9113,6 +9599,33 @@
       </p:pic>
     </p:spTree>
   </p:cSld>
+  <p:timing>
+    <p:tnLst>
+      <p:par>
+        <p:cTn id="51" dur="indefinite" restart="never" nodeType="tmRoot">
+          <p:childTnLst>
+            <p:seq>
+              <p:cTn id="52" nodeType="mainSeq"/>
+              <p:prevCondLst>
+                <p:cond delay="0" evt="onPrev">
+                  <p:tgtEl>
+                    <p:sldTgt/>
+                  </p:tgtEl>
+                </p:cond>
+              </p:prevCondLst>
+              <p:nextCondLst>
+                <p:cond delay="0" evt="onNext">
+                  <p:tgtEl>
+                    <p:sldTgt/>
+                  </p:tgtEl>
+                </p:cond>
+              </p:nextCondLst>
+            </p:seq>
+          </p:childTnLst>
+        </p:cTn>
+      </p:par>
+    </p:tnLst>
+  </p:timing>
 </p:sld>
 </file>
 
@@ -9142,7 +9655,7 @@
         <p:spPr>
           <a:xfrm>
             <a:off x="457200" y="274680"/>
-            <a:ext cx="8228880" cy="1142280"/>
+            <a:ext cx="8228160" cy="1141560"/>
           </a:xfrm>
           <a:prstGeom prst="rect">
             <a:avLst/>
@@ -9182,7 +9695,7 @@
         <p:spPr>
           <a:xfrm>
             <a:off x="457200" y="1600200"/>
-            <a:ext cx="8228880" cy="4525200"/>
+            <a:ext cx="8228160" cy="4524480"/>
           </a:xfrm>
           <a:prstGeom prst="rect">
             <a:avLst/>
@@ -9345,6 +9858,33 @@
       </p:sp>
     </p:spTree>
   </p:cSld>
+  <p:timing>
+    <p:tnLst>
+      <p:par>
+        <p:cTn id="53" dur="indefinite" restart="never" nodeType="tmRoot">
+          <p:childTnLst>
+            <p:seq>
+              <p:cTn id="54" nodeType="mainSeq"/>
+              <p:prevCondLst>
+                <p:cond delay="0" evt="onPrev">
+                  <p:tgtEl>
+                    <p:sldTgt/>
+                  </p:tgtEl>
+                </p:cond>
+              </p:prevCondLst>
+              <p:nextCondLst>
+                <p:cond delay="0" evt="onNext">
+                  <p:tgtEl>
+                    <p:sldTgt/>
+                  </p:tgtEl>
+                </p:cond>
+              </p:nextCondLst>
+            </p:seq>
+          </p:childTnLst>
+        </p:cTn>
+      </p:par>
+    </p:tnLst>
+  </p:timing>
 </p:sld>
 </file>
 
@@ -9374,7 +9914,7 @@
         <p:spPr>
           <a:xfrm>
             <a:off x="609480" y="2514600"/>
-            <a:ext cx="8228880" cy="1142280"/>
+            <a:ext cx="8228160" cy="1141560"/>
           </a:xfrm>
           <a:prstGeom prst="rect">
             <a:avLst/>
@@ -9407,6 +9947,33 @@
       </p:sp>
     </p:spTree>
   </p:cSld>
+  <p:timing>
+    <p:tnLst>
+      <p:par>
+        <p:cTn id="55" dur="indefinite" restart="never" nodeType="tmRoot">
+          <p:childTnLst>
+            <p:seq>
+              <p:cTn id="56" nodeType="mainSeq"/>
+              <p:prevCondLst>
+                <p:cond delay="0" evt="onPrev">
+                  <p:tgtEl>
+                    <p:sldTgt/>
+                  </p:tgtEl>
+                </p:cond>
+              </p:prevCondLst>
+              <p:nextCondLst>
+                <p:cond delay="0" evt="onNext">
+                  <p:tgtEl>
+                    <p:sldTgt/>
+                  </p:tgtEl>
+                </p:cond>
+              </p:nextCondLst>
+            </p:seq>
+          </p:childTnLst>
+        </p:cTn>
+      </p:par>
+    </p:tnLst>
+  </p:timing>
 </p:sld>
 </file>
 
@@ -9436,7 +10003,7 @@
         <p:spPr>
           <a:xfrm>
             <a:off x="685800" y="380880"/>
-            <a:ext cx="7771680" cy="1142280"/>
+            <a:ext cx="7770960" cy="1141560"/>
           </a:xfrm>
           <a:prstGeom prst="rect">
             <a:avLst/>
@@ -9476,7 +10043,7 @@
         <p:spPr>
           <a:xfrm>
             <a:off x="685800" y="1828800"/>
-            <a:ext cx="7848000" cy="4494960"/>
+            <a:ext cx="7847280" cy="4494240"/>
           </a:xfrm>
           <a:prstGeom prst="rect">
             <a:avLst/>
@@ -9497,7 +10064,7 @@
               <a:buChar char="•"/>
             </a:pPr>
             <a:r>
-              <a:rPr lang="en-US" sz="3200">
+              <a:rPr lang="en-US" sz="2200">
                 <a:solidFill>
                   <a:srgbClr val="ffffff"/>
                 </a:solidFill>
@@ -9516,7 +10083,7 @@
               <a:buChar char="•"/>
             </a:pPr>
             <a:r>
-              <a:rPr lang="en-US" sz="3200">
+              <a:rPr lang="en-US" sz="2200">
                 <a:solidFill>
                   <a:srgbClr val="ffffff"/>
                 </a:solidFill>
@@ -9535,7 +10102,7 @@
               <a:buChar char="–"/>
             </a:pPr>
             <a:r>
-              <a:rPr lang="en-US" sz="2800">
+              <a:rPr lang="en-US" sz="2200">
                 <a:solidFill>
                   <a:srgbClr val="ffffff"/>
                 </a:solidFill>
@@ -9554,7 +10121,7 @@
               <a:buChar char="–"/>
             </a:pPr>
             <a:r>
-              <a:rPr lang="en-US" sz="2800">
+              <a:rPr lang="en-US" sz="2200">
                 <a:solidFill>
                   <a:srgbClr val="ffffff"/>
                 </a:solidFill>
@@ -9573,7 +10140,7 @@
               <a:buChar char="•"/>
             </a:pPr>
             <a:r>
-              <a:rPr lang="en-US" sz="3200">
+              <a:rPr lang="en-US" sz="2200">
                 <a:solidFill>
                   <a:srgbClr val="ffffff"/>
                 </a:solidFill>
@@ -9592,7 +10159,7 @@
               <a:buChar char="•"/>
             </a:pPr>
             <a:r>
-              <a:rPr lang="en-US" sz="3200">
+              <a:rPr lang="en-US" sz="2200">
                 <a:solidFill>
                   <a:srgbClr val="ffffff"/>
                 </a:solidFill>
@@ -9611,7 +10178,7 @@
               <a:buChar char="•"/>
             </a:pPr>
             <a:r>
-              <a:rPr b="1" lang="en-US" sz="3200">
+              <a:rPr b="1" lang="en-US" sz="2200">
                 <a:solidFill>
                   <a:srgbClr val="ffffff"/>
                 </a:solidFill>
@@ -9620,7 +10187,7 @@
               <a:t>main()</a:t>
             </a:r>
             <a:r>
-              <a:rPr lang="en-US" sz="3200">
+              <a:rPr lang="en-US" sz="2200">
                 <a:solidFill>
                   <a:srgbClr val="ffffff"/>
                 </a:solidFill>
@@ -9639,7 +10206,7 @@
               <a:buChar char="–"/>
             </a:pPr>
             <a:r>
-              <a:rPr lang="en-US" sz="2800">
+              <a:rPr lang="en-US" sz="2200">
                 <a:solidFill>
                   <a:srgbClr val="ffffff"/>
                 </a:solidFill>
@@ -9658,7 +10225,7 @@
               <a:buChar char="•"/>
             </a:pPr>
             <a:r>
-              <a:rPr lang="en-US" sz="3200">
+              <a:rPr lang="en-US" sz="2200">
                 <a:solidFill>
                   <a:srgbClr val="ffffff"/>
                 </a:solidFill>
@@ -9672,6 +10239,33 @@
       </p:sp>
     </p:spTree>
   </p:cSld>
+  <p:timing>
+    <p:tnLst>
+      <p:par>
+        <p:cTn id="57" dur="indefinite" restart="never" nodeType="tmRoot">
+          <p:childTnLst>
+            <p:seq>
+              <p:cTn id="58" nodeType="mainSeq"/>
+              <p:prevCondLst>
+                <p:cond delay="0" evt="onPrev">
+                  <p:tgtEl>
+                    <p:sldTgt/>
+                  </p:tgtEl>
+                </p:cond>
+              </p:prevCondLst>
+              <p:nextCondLst>
+                <p:cond delay="0" evt="onNext">
+                  <p:tgtEl>
+                    <p:sldTgt/>
+                  </p:tgtEl>
+                </p:cond>
+              </p:nextCondLst>
+            </p:seq>
+          </p:childTnLst>
+        </p:cTn>
+      </p:par>
+    </p:tnLst>
+  </p:timing>
 </p:sld>
 </file>
 
@@ -9701,7 +10295,7 @@
         <p:spPr>
           <a:xfrm>
             <a:off x="457200" y="274680"/>
-            <a:ext cx="8228880" cy="1142280"/>
+            <a:ext cx="8228160" cy="1141560"/>
           </a:xfrm>
           <a:prstGeom prst="rect">
             <a:avLst/>
@@ -9741,7 +10335,7 @@
         <p:spPr>
           <a:xfrm>
             <a:off x="685800" y="1676520"/>
-            <a:ext cx="7771680" cy="4114080"/>
+            <a:ext cx="7770960" cy="4113360"/>
           </a:xfrm>
           <a:prstGeom prst="rect">
             <a:avLst/>
@@ -9762,7 +10356,7 @@
               <a:buChar char="•"/>
             </a:pPr>
             <a:r>
-              <a:rPr lang="en-US" sz="3200">
+              <a:rPr lang="en-US" sz="2800">
                 <a:solidFill>
                   <a:srgbClr val="ffffff"/>
                 </a:solidFill>
@@ -9819,7 +10413,7 @@
               <a:buChar char="•"/>
             </a:pPr>
             <a:r>
-              <a:rPr lang="en-US" sz="3200">
+              <a:rPr lang="en-US" sz="2800">
                 <a:solidFill>
                   <a:srgbClr val="ffffff"/>
                 </a:solidFill>
@@ -9838,7 +10432,7 @@
               <a:buChar char="•"/>
             </a:pPr>
             <a:r>
-              <a:rPr lang="en-US" sz="3200">
+              <a:rPr lang="en-US" sz="2800">
                 <a:solidFill>
                   <a:srgbClr val="ffffff"/>
                 </a:solidFill>
@@ -9852,6 +10446,33 @@
       </p:sp>
     </p:spTree>
   </p:cSld>
+  <p:timing>
+    <p:tnLst>
+      <p:par>
+        <p:cTn id="5" dur="indefinite" restart="never" nodeType="tmRoot">
+          <p:childTnLst>
+            <p:seq>
+              <p:cTn id="6" nodeType="mainSeq"/>
+              <p:prevCondLst>
+                <p:cond delay="0" evt="onPrev">
+                  <p:tgtEl>
+                    <p:sldTgt/>
+                  </p:tgtEl>
+                </p:cond>
+              </p:prevCondLst>
+              <p:nextCondLst>
+                <p:cond delay="0" evt="onNext">
+                  <p:tgtEl>
+                    <p:sldTgt/>
+                  </p:tgtEl>
+                </p:cond>
+              </p:nextCondLst>
+            </p:seq>
+          </p:childTnLst>
+        </p:cTn>
+      </p:par>
+    </p:tnLst>
+  </p:timing>
 </p:sld>
 </file>
 
@@ -9881,7 +10502,7 @@
         <p:spPr>
           <a:xfrm>
             <a:off x="457200" y="274680"/>
-            <a:ext cx="8228880" cy="1142280"/>
+            <a:ext cx="8228160" cy="1141560"/>
           </a:xfrm>
           <a:prstGeom prst="rect">
             <a:avLst/>
@@ -9921,7 +10542,7 @@
         <p:spPr>
           <a:xfrm>
             <a:off x="457200" y="1600200"/>
-            <a:ext cx="8228880" cy="4525200"/>
+            <a:ext cx="8228160" cy="4524480"/>
           </a:xfrm>
           <a:prstGeom prst="rect">
             <a:avLst/>
@@ -10079,6 +10700,33 @@
       </p:sp>
     </p:spTree>
   </p:cSld>
+  <p:timing>
+    <p:tnLst>
+      <p:par>
+        <p:cTn id="59" dur="indefinite" restart="never" nodeType="tmRoot">
+          <p:childTnLst>
+            <p:seq>
+              <p:cTn id="60" nodeType="mainSeq"/>
+              <p:prevCondLst>
+                <p:cond delay="0" evt="onPrev">
+                  <p:tgtEl>
+                    <p:sldTgt/>
+                  </p:tgtEl>
+                </p:cond>
+              </p:prevCondLst>
+              <p:nextCondLst>
+                <p:cond delay="0" evt="onNext">
+                  <p:tgtEl>
+                    <p:sldTgt/>
+                  </p:tgtEl>
+                </p:cond>
+              </p:nextCondLst>
+            </p:seq>
+          </p:childTnLst>
+        </p:cTn>
+      </p:par>
+    </p:tnLst>
+  </p:timing>
 </p:sld>
 </file>
 
@@ -10108,7 +10756,7 @@
         <p:spPr>
           <a:xfrm>
             <a:off x="457200" y="274680"/>
-            <a:ext cx="8228880" cy="1142280"/>
+            <a:ext cx="8228160" cy="1141560"/>
           </a:xfrm>
           <a:prstGeom prst="rect">
             <a:avLst/>
@@ -10148,7 +10796,7 @@
         <p:spPr>
           <a:xfrm>
             <a:off x="457200" y="1600200"/>
-            <a:ext cx="8228880" cy="4525200"/>
+            <a:ext cx="8228160" cy="4524480"/>
           </a:xfrm>
           <a:prstGeom prst="rect">
             <a:avLst/>
@@ -10221,6 +10869,33 @@
       </p:sp>
     </p:spTree>
   </p:cSld>
+  <p:timing>
+    <p:tnLst>
+      <p:par>
+        <p:cTn id="61" dur="indefinite" restart="never" nodeType="tmRoot">
+          <p:childTnLst>
+            <p:seq>
+              <p:cTn id="62" nodeType="mainSeq"/>
+              <p:prevCondLst>
+                <p:cond delay="0" evt="onPrev">
+                  <p:tgtEl>
+                    <p:sldTgt/>
+                  </p:tgtEl>
+                </p:cond>
+              </p:prevCondLst>
+              <p:nextCondLst>
+                <p:cond delay="0" evt="onNext">
+                  <p:tgtEl>
+                    <p:sldTgt/>
+                  </p:tgtEl>
+                </p:cond>
+              </p:nextCondLst>
+            </p:seq>
+          </p:childTnLst>
+        </p:cTn>
+      </p:par>
+    </p:tnLst>
+  </p:timing>
 </p:sld>
 </file>
 
@@ -10250,7 +10925,7 @@
         <p:spPr>
           <a:xfrm>
             <a:off x="457200" y="274680"/>
-            <a:ext cx="8228880" cy="1142280"/>
+            <a:ext cx="8228160" cy="1141560"/>
           </a:xfrm>
           <a:prstGeom prst="rect">
             <a:avLst/>
@@ -10290,7 +10965,7 @@
         <p:spPr>
           <a:xfrm>
             <a:off x="762120" y="1676520"/>
-            <a:ext cx="7848000" cy="4419000"/>
+            <a:ext cx="7847280" cy="4418280"/>
           </a:xfrm>
           <a:prstGeom prst="rect">
             <a:avLst/>
@@ -10311,7 +10986,7 @@
               <a:buChar char="•"/>
             </a:pPr>
             <a:r>
-              <a:rPr lang="en-US" sz="3200">
+              <a:rPr lang="en-US" sz="2400">
                 <a:solidFill>
                   <a:srgbClr val="ffffff"/>
                 </a:solidFill>
@@ -10330,7 +11005,7 @@
               <a:buChar char="•"/>
             </a:pPr>
             <a:r>
-              <a:rPr lang="en-US" sz="3200">
+              <a:rPr lang="en-US" sz="2400">
                 <a:solidFill>
                   <a:srgbClr val="ffffff"/>
                 </a:solidFill>
@@ -10339,7 +11014,7 @@
               <a:t>These are special commands called </a:t>
             </a:r>
             <a:r>
-              <a:rPr i="1" lang="en-US" sz="3200">
+              <a:rPr i="1" lang="en-US" sz="2400">
                 <a:solidFill>
                   <a:srgbClr val="ffffff"/>
                 </a:solidFill>
@@ -10358,7 +11033,7 @@
               <a:buChar char="•"/>
             </a:pPr>
             <a:r>
-              <a:rPr lang="en-US" sz="3200">
+              <a:rPr lang="en-US" sz="2400">
                 <a:solidFill>
                   <a:srgbClr val="ffffff"/>
                 </a:solidFill>
@@ -10367,7 +11042,7 @@
               <a:t>Indicate certain things to be done to the program code </a:t>
             </a:r>
             <a:r>
-              <a:rPr lang="en-US" sz="3200" u="sng">
+              <a:rPr lang="en-US" sz="2400" u="sng">
                 <a:solidFill>
                   <a:srgbClr val="ffffff"/>
                 </a:solidFill>
@@ -10376,7 +11051,7 @@
               <a:t>prior to</a:t>
             </a:r>
             <a:r>
-              <a:rPr lang="en-US" sz="3200">
+              <a:rPr lang="en-US" sz="2400">
                 <a:solidFill>
                   <a:srgbClr val="ffffff"/>
                 </a:solidFill>
@@ -10395,7 +11070,7 @@
               <a:buChar char="–"/>
             </a:pPr>
             <a:r>
-              <a:rPr lang="en-US" sz="2800">
+              <a:rPr lang="en-US" sz="2400">
                 <a:solidFill>
                   <a:srgbClr val="ffffff"/>
                 </a:solidFill>
@@ -10414,7 +11089,7 @@
               <a:buChar char="–"/>
             </a:pPr>
             <a:r>
-              <a:rPr lang="en-US" sz="2800">
+              <a:rPr lang="en-US" sz="2400">
                 <a:solidFill>
                   <a:srgbClr val="ffffff"/>
                 </a:solidFill>
@@ -10433,7 +11108,7 @@
               <a:buChar char="•"/>
             </a:pPr>
             <a:r>
-              <a:rPr lang="en-US" sz="3200">
+              <a:rPr lang="en-US" sz="2400">
                 <a:solidFill>
                   <a:srgbClr val="ffffff"/>
                 </a:solidFill>
@@ -10447,6 +11122,33 @@
       </p:sp>
     </p:spTree>
   </p:cSld>
+  <p:timing>
+    <p:tnLst>
+      <p:par>
+        <p:cTn id="63" dur="indefinite" restart="never" nodeType="tmRoot">
+          <p:childTnLst>
+            <p:seq>
+              <p:cTn id="64" nodeType="mainSeq"/>
+              <p:prevCondLst>
+                <p:cond delay="0" evt="onPrev">
+                  <p:tgtEl>
+                    <p:sldTgt/>
+                  </p:tgtEl>
+                </p:cond>
+              </p:prevCondLst>
+              <p:nextCondLst>
+                <p:cond delay="0" evt="onNext">
+                  <p:tgtEl>
+                    <p:sldTgt/>
+                  </p:tgtEl>
+                </p:cond>
+              </p:nextCondLst>
+            </p:seq>
+          </p:childTnLst>
+        </p:cTn>
+      </p:par>
+    </p:tnLst>
+  </p:timing>
 </p:sld>
 </file>
 
@@ -10476,7 +11178,7 @@
         <p:spPr>
           <a:xfrm>
             <a:off x="457200" y="274680"/>
-            <a:ext cx="8228880" cy="1142280"/>
+            <a:ext cx="8228160" cy="1141560"/>
           </a:xfrm>
           <a:prstGeom prst="rect">
             <a:avLst/>
@@ -10516,7 +11218,7 @@
         <p:spPr>
           <a:xfrm>
             <a:off x="457200" y="1523880"/>
-            <a:ext cx="8228880" cy="4601520"/>
+            <a:ext cx="8228160" cy="4600800"/>
           </a:xfrm>
           <a:prstGeom prst="rect">
             <a:avLst/>
@@ -10645,6 +11347,33 @@
       </p:sp>
     </p:spTree>
   </p:cSld>
+  <p:timing>
+    <p:tnLst>
+      <p:par>
+        <p:cTn id="65" dur="indefinite" restart="never" nodeType="tmRoot">
+          <p:childTnLst>
+            <p:seq>
+              <p:cTn id="66" nodeType="mainSeq"/>
+              <p:prevCondLst>
+                <p:cond delay="0" evt="onPrev">
+                  <p:tgtEl>
+                    <p:sldTgt/>
+                  </p:tgtEl>
+                </p:cond>
+              </p:prevCondLst>
+              <p:nextCondLst>
+                <p:cond delay="0" evt="onNext">
+                  <p:tgtEl>
+                    <p:sldTgt/>
+                  </p:tgtEl>
+                </p:cond>
+              </p:nextCondLst>
+            </p:seq>
+          </p:childTnLst>
+        </p:cTn>
+      </p:par>
+    </p:tnLst>
+  </p:timing>
 </p:sld>
 </file>
 
@@ -10674,7 +11403,7 @@
         <p:spPr>
           <a:xfrm>
             <a:off x="457200" y="274680"/>
-            <a:ext cx="8228880" cy="1142280"/>
+            <a:ext cx="8228160" cy="1141560"/>
           </a:xfrm>
           <a:prstGeom prst="rect">
             <a:avLst/>
@@ -10723,7 +11452,7 @@
         <p:spPr>
           <a:xfrm>
             <a:off x="457200" y="1523880"/>
-            <a:ext cx="8228880" cy="4601520"/>
+            <a:ext cx="8228160" cy="4600800"/>
           </a:xfrm>
           <a:prstGeom prst="rect">
             <a:avLst/>
@@ -10890,6 +11619,33 @@
       </p:sp>
     </p:spTree>
   </p:cSld>
+  <p:timing>
+    <p:tnLst>
+      <p:par>
+        <p:cTn id="67" dur="indefinite" restart="never" nodeType="tmRoot">
+          <p:childTnLst>
+            <p:seq>
+              <p:cTn id="68" nodeType="mainSeq"/>
+              <p:prevCondLst>
+                <p:cond delay="0" evt="onPrev">
+                  <p:tgtEl>
+                    <p:sldTgt/>
+                  </p:tgtEl>
+                </p:cond>
+              </p:prevCondLst>
+              <p:nextCondLst>
+                <p:cond delay="0" evt="onNext">
+                  <p:tgtEl>
+                    <p:sldTgt/>
+                  </p:tgtEl>
+                </p:cond>
+              </p:nextCondLst>
+            </p:seq>
+          </p:childTnLst>
+        </p:cTn>
+      </p:par>
+    </p:tnLst>
+  </p:timing>
 </p:sld>
 </file>
 
@@ -10919,7 +11675,7 @@
         <p:spPr>
           <a:xfrm>
             <a:off x="457200" y="274680"/>
-            <a:ext cx="8228880" cy="1142280"/>
+            <a:ext cx="8228160" cy="1141560"/>
           </a:xfrm>
           <a:prstGeom prst="rect">
             <a:avLst/>
@@ -10968,7 +11724,7 @@
         <p:spPr>
           <a:xfrm>
             <a:off x="533520" y="1523880"/>
-            <a:ext cx="8609760" cy="4571280"/>
+            <a:ext cx="8609040" cy="4570560"/>
           </a:xfrm>
           <a:prstGeom prst="rect">
             <a:avLst/>
@@ -11057,6 +11813,33 @@
       </p:sp>
     </p:spTree>
   </p:cSld>
+  <p:timing>
+    <p:tnLst>
+      <p:par>
+        <p:cTn id="69" dur="indefinite" restart="never" nodeType="tmRoot">
+          <p:childTnLst>
+            <p:seq>
+              <p:cTn id="70" nodeType="mainSeq"/>
+              <p:prevCondLst>
+                <p:cond delay="0" evt="onPrev">
+                  <p:tgtEl>
+                    <p:sldTgt/>
+                  </p:tgtEl>
+                </p:cond>
+              </p:prevCondLst>
+              <p:nextCondLst>
+                <p:cond delay="0" evt="onNext">
+                  <p:tgtEl>
+                    <p:sldTgt/>
+                  </p:tgtEl>
+                </p:cond>
+              </p:nextCondLst>
+            </p:seq>
+          </p:childTnLst>
+        </p:cTn>
+      </p:par>
+    </p:tnLst>
+  </p:timing>
 </p:sld>
 </file>
 
@@ -11086,7 +11869,7 @@
         <p:spPr>
           <a:xfrm>
             <a:off x="457200" y="274680"/>
-            <a:ext cx="8228880" cy="1142280"/>
+            <a:ext cx="8228160" cy="1141560"/>
           </a:xfrm>
           <a:prstGeom prst="rect">
             <a:avLst/>
@@ -11144,7 +11927,7 @@
         <p:spPr>
           <a:xfrm>
             <a:off x="457200" y="1447920"/>
-            <a:ext cx="8228880" cy="4677480"/>
+            <a:ext cx="8228160" cy="4676760"/>
           </a:xfrm>
           <a:prstGeom prst="rect">
             <a:avLst/>
@@ -11163,7 +11946,7 @@
               </a:lnSpc>
             </a:pPr>
             <a:r>
-              <a:rPr lang="en-US" sz="3200" u="sng">
+              <a:rPr lang="en-US" sz="2600" u="sng">
                 <a:solidFill>
                   <a:srgbClr val="ffffff"/>
                 </a:solidFill>
@@ -11182,7 +11965,7 @@
               <a:buChar char="•"/>
             </a:pPr>
             <a:r>
-              <a:rPr lang="en-US" sz="3200">
+              <a:rPr lang="en-US" sz="2600">
                 <a:solidFill>
                   <a:srgbClr val="ffffff"/>
                 </a:solidFill>
@@ -11191,7 +11974,7 @@
               <a:t>Causes the preprocessor to physically replace in the source code </a:t>
             </a:r>
             <a:r>
-              <a:rPr lang="en-US" sz="3200" u="sng">
+              <a:rPr lang="en-US" sz="2600" u="sng">
                 <a:solidFill>
                   <a:srgbClr val="ffffff"/>
                 </a:solidFill>
@@ -11200,7 +11983,7 @@
               <a:t>prior to compilation</a:t>
             </a:r>
             <a:r>
-              <a:rPr lang="en-US" sz="3200">
+              <a:rPr lang="en-US" sz="2600">
                 <a:solidFill>
                   <a:srgbClr val="ffffff"/>
                 </a:solidFill>
@@ -11217,7 +12000,7 @@
               </a:lnSpc>
             </a:pPr>
             <a:r>
-              <a:rPr lang="en-US" sz="3200">
+              <a:rPr lang="en-US" sz="2600">
                 <a:solidFill>
                   <a:srgbClr val="ffffff"/>
                 </a:solidFill>
@@ -11236,7 +12019,7 @@
               <a:buChar char="•"/>
             </a:pPr>
             <a:r>
-              <a:rPr lang="en-US" sz="3200">
+              <a:rPr lang="en-US" sz="2600">
                 <a:solidFill>
                   <a:srgbClr val="ffffff"/>
                 </a:solidFill>
@@ -11250,6 +12033,33 @@
       </p:sp>
     </p:spTree>
   </p:cSld>
+  <p:timing>
+    <p:tnLst>
+      <p:par>
+        <p:cTn id="71" dur="indefinite" restart="never" nodeType="tmRoot">
+          <p:childTnLst>
+            <p:seq>
+              <p:cTn id="72" nodeType="mainSeq"/>
+              <p:prevCondLst>
+                <p:cond delay="0" evt="onPrev">
+                  <p:tgtEl>
+                    <p:sldTgt/>
+                  </p:tgtEl>
+                </p:cond>
+              </p:prevCondLst>
+              <p:nextCondLst>
+                <p:cond delay="0" evt="onNext">
+                  <p:tgtEl>
+                    <p:sldTgt/>
+                  </p:tgtEl>
+                </p:cond>
+              </p:nextCondLst>
+            </p:seq>
+          </p:childTnLst>
+        </p:cTn>
+      </p:par>
+    </p:tnLst>
+  </p:timing>
 </p:sld>
 </file>
 
@@ -11279,7 +12089,7 @@
         <p:spPr>
           <a:xfrm>
             <a:off x="457200" y="274680"/>
-            <a:ext cx="8228880" cy="1142280"/>
+            <a:ext cx="8228160" cy="1141560"/>
           </a:xfrm>
           <a:prstGeom prst="rect">
             <a:avLst/>
@@ -11346,7 +12156,7 @@
         <p:spPr>
           <a:xfrm>
             <a:off x="685800" y="1523880"/>
-            <a:ext cx="7771680" cy="4723560"/>
+            <a:ext cx="7770960" cy="4722840"/>
           </a:xfrm>
           <a:prstGeom prst="rect">
             <a:avLst/>
@@ -11473,6 +12283,33 @@
       </p:sp>
     </p:spTree>
   </p:cSld>
+  <p:timing>
+    <p:tnLst>
+      <p:par>
+        <p:cTn id="73" dur="indefinite" restart="never" nodeType="tmRoot">
+          <p:childTnLst>
+            <p:seq>
+              <p:cTn id="74" nodeType="mainSeq"/>
+              <p:prevCondLst>
+                <p:cond delay="0" evt="onPrev">
+                  <p:tgtEl>
+                    <p:sldTgt/>
+                  </p:tgtEl>
+                </p:cond>
+              </p:prevCondLst>
+              <p:nextCondLst>
+                <p:cond delay="0" evt="onNext">
+                  <p:tgtEl>
+                    <p:sldTgt/>
+                  </p:tgtEl>
+                </p:cond>
+              </p:nextCondLst>
+            </p:seq>
+          </p:childTnLst>
+        </p:cTn>
+      </p:par>
+    </p:tnLst>
+  </p:timing>
 </p:sld>
 </file>
 
@@ -11502,7 +12339,7 @@
         <p:spPr>
           <a:xfrm>
             <a:off x="457200" y="274680"/>
-            <a:ext cx="8228880" cy="1142280"/>
+            <a:ext cx="8228160" cy="1141560"/>
           </a:xfrm>
           <a:prstGeom prst="rect">
             <a:avLst/>
@@ -11569,7 +12406,7 @@
         <p:spPr>
           <a:xfrm>
             <a:off x="457200" y="1600200"/>
-            <a:ext cx="8228880" cy="4525200"/>
+            <a:ext cx="8228160" cy="4524480"/>
           </a:xfrm>
           <a:prstGeom prst="rect">
             <a:avLst/>
@@ -11759,6 +12596,33 @@
       </p:sp>
     </p:spTree>
   </p:cSld>
+  <p:timing>
+    <p:tnLst>
+      <p:par>
+        <p:cTn id="75" dur="indefinite" restart="never" nodeType="tmRoot">
+          <p:childTnLst>
+            <p:seq>
+              <p:cTn id="76" nodeType="mainSeq"/>
+              <p:prevCondLst>
+                <p:cond delay="0" evt="onPrev">
+                  <p:tgtEl>
+                    <p:sldTgt/>
+                  </p:tgtEl>
+                </p:cond>
+              </p:prevCondLst>
+              <p:nextCondLst>
+                <p:cond delay="0" evt="onNext">
+                  <p:tgtEl>
+                    <p:sldTgt/>
+                  </p:tgtEl>
+                </p:cond>
+              </p:nextCondLst>
+            </p:seq>
+          </p:childTnLst>
+        </p:cTn>
+      </p:par>
+    </p:tnLst>
+  </p:timing>
 </p:sld>
 </file>
 
@@ -11788,7 +12652,7 @@
         <p:spPr>
           <a:xfrm>
             <a:off x="457200" y="274680"/>
-            <a:ext cx="8228880" cy="1142280"/>
+            <a:ext cx="8228160" cy="1141560"/>
           </a:xfrm>
           <a:prstGeom prst="rect">
             <a:avLst/>
@@ -11855,7 +12719,7 @@
         <p:spPr>
           <a:xfrm>
             <a:off x="457200" y="1600200"/>
-            <a:ext cx="8228880" cy="4525200"/>
+            <a:ext cx="8228160" cy="4524480"/>
           </a:xfrm>
           <a:prstGeom prst="rect">
             <a:avLst/>
@@ -11975,6 +12839,33 @@
       </p:sp>
     </p:spTree>
   </p:cSld>
+  <p:timing>
+    <p:tnLst>
+      <p:par>
+        <p:cTn id="77" dur="indefinite" restart="never" nodeType="tmRoot">
+          <p:childTnLst>
+            <p:seq>
+              <p:cTn id="78" nodeType="mainSeq"/>
+              <p:prevCondLst>
+                <p:cond delay="0" evt="onPrev">
+                  <p:tgtEl>
+                    <p:sldTgt/>
+                  </p:tgtEl>
+                </p:cond>
+              </p:prevCondLst>
+              <p:nextCondLst>
+                <p:cond delay="0" evt="onNext">
+                  <p:tgtEl>
+                    <p:sldTgt/>
+                  </p:tgtEl>
+                </p:cond>
+              </p:nextCondLst>
+            </p:seq>
+          </p:childTnLst>
+        </p:cTn>
+      </p:par>
+    </p:tnLst>
+  </p:timing>
 </p:sld>
 </file>
 
@@ -12004,7 +12895,7 @@
         <p:spPr>
           <a:xfrm>
             <a:off x="457200" y="274680"/>
-            <a:ext cx="8228880" cy="1142280"/>
+            <a:ext cx="8228160" cy="1141560"/>
           </a:xfrm>
           <a:prstGeom prst="rect">
             <a:avLst/>
@@ -12044,7 +12935,7 @@
         <p:spPr>
           <a:xfrm>
             <a:off x="457200" y="1600200"/>
-            <a:ext cx="8228880" cy="4525200"/>
+            <a:ext cx="8228160" cy="4524480"/>
           </a:xfrm>
           <a:prstGeom prst="rect">
             <a:avLst/>
@@ -12258,6 +13149,33 @@
       </p:sp>
     </p:spTree>
   </p:cSld>
+  <p:timing>
+    <p:tnLst>
+      <p:par>
+        <p:cTn id="7" dur="indefinite" restart="never" nodeType="tmRoot">
+          <p:childTnLst>
+            <p:seq>
+              <p:cTn id="8" nodeType="mainSeq"/>
+              <p:prevCondLst>
+                <p:cond delay="0" evt="onPrev">
+                  <p:tgtEl>
+                    <p:sldTgt/>
+                  </p:tgtEl>
+                </p:cond>
+              </p:prevCondLst>
+              <p:nextCondLst>
+                <p:cond delay="0" evt="onNext">
+                  <p:tgtEl>
+                    <p:sldTgt/>
+                  </p:tgtEl>
+                </p:cond>
+              </p:nextCondLst>
+            </p:seq>
+          </p:childTnLst>
+        </p:cTn>
+      </p:par>
+    </p:tnLst>
+  </p:timing>
 </p:sld>
 </file>
 
@@ -12287,7 +13205,7 @@
         <p:spPr>
           <a:xfrm>
             <a:off x="457200" y="274680"/>
-            <a:ext cx="8228880" cy="1142280"/>
+            <a:ext cx="8228160" cy="1141560"/>
           </a:xfrm>
           <a:prstGeom prst="rect">
             <a:avLst/>
@@ -12327,7 +13245,7 @@
         <p:spPr>
           <a:xfrm>
             <a:off x="457200" y="1600200"/>
-            <a:ext cx="8228880" cy="4525200"/>
+            <a:ext cx="8228160" cy="4524480"/>
           </a:xfrm>
           <a:prstGeom prst="rect">
             <a:avLst/>
@@ -12418,6 +13336,33 @@
       </p:sp>
     </p:spTree>
   </p:cSld>
+  <p:timing>
+    <p:tnLst>
+      <p:par>
+        <p:cTn id="79" dur="indefinite" restart="never" nodeType="tmRoot">
+          <p:childTnLst>
+            <p:seq>
+              <p:cTn id="80" nodeType="mainSeq"/>
+              <p:prevCondLst>
+                <p:cond delay="0" evt="onPrev">
+                  <p:tgtEl>
+                    <p:sldTgt/>
+                  </p:tgtEl>
+                </p:cond>
+              </p:prevCondLst>
+              <p:nextCondLst>
+                <p:cond delay="0" evt="onNext">
+                  <p:tgtEl>
+                    <p:sldTgt/>
+                  </p:tgtEl>
+                </p:cond>
+              </p:nextCondLst>
+            </p:seq>
+          </p:childTnLst>
+        </p:cTn>
+      </p:par>
+    </p:tnLst>
+  </p:timing>
 </p:sld>
 </file>
 
@@ -12447,7 +13392,7 @@
         <p:spPr>
           <a:xfrm>
             <a:off x="457200" y="274680"/>
-            <a:ext cx="8228880" cy="1142280"/>
+            <a:ext cx="8228160" cy="1141560"/>
           </a:xfrm>
           <a:prstGeom prst="rect">
             <a:avLst/>
@@ -12514,7 +13459,7 @@
         <p:spPr>
           <a:xfrm>
             <a:off x="457200" y="1600200"/>
-            <a:ext cx="8228880" cy="4525200"/>
+            <a:ext cx="8228160" cy="4524480"/>
           </a:xfrm>
           <a:prstGeom prst="rect">
             <a:avLst/>
@@ -12615,6 +13560,33 @@
       </p:sp>
     </p:spTree>
   </p:cSld>
+  <p:timing>
+    <p:tnLst>
+      <p:par>
+        <p:cTn id="81" dur="indefinite" restart="never" nodeType="tmRoot">
+          <p:childTnLst>
+            <p:seq>
+              <p:cTn id="82" nodeType="mainSeq"/>
+              <p:prevCondLst>
+                <p:cond delay="0" evt="onPrev">
+                  <p:tgtEl>
+                    <p:sldTgt/>
+                  </p:tgtEl>
+                </p:cond>
+              </p:prevCondLst>
+              <p:nextCondLst>
+                <p:cond delay="0" evt="onNext">
+                  <p:tgtEl>
+                    <p:sldTgt/>
+                  </p:tgtEl>
+                </p:cond>
+              </p:nextCondLst>
+            </p:seq>
+          </p:childTnLst>
+        </p:cTn>
+      </p:par>
+    </p:tnLst>
+  </p:timing>
 </p:sld>
 </file>
 
@@ -12644,7 +13616,7 @@
         <p:spPr>
           <a:xfrm>
             <a:off x="457200" y="274680"/>
-            <a:ext cx="8228880" cy="1142280"/>
+            <a:ext cx="8228160" cy="1141560"/>
           </a:xfrm>
           <a:prstGeom prst="rect">
             <a:avLst/>
@@ -12702,7 +13674,7 @@
         <p:spPr>
           <a:xfrm>
             <a:off x="457200" y="1600200"/>
-            <a:ext cx="8228880" cy="4525200"/>
+            <a:ext cx="8228160" cy="4524480"/>
           </a:xfrm>
           <a:prstGeom prst="rect">
             <a:avLst/>
@@ -12877,6 +13849,33 @@
       </p:sp>
     </p:spTree>
   </p:cSld>
+  <p:timing>
+    <p:tnLst>
+      <p:par>
+        <p:cTn id="83" dur="indefinite" restart="never" nodeType="tmRoot">
+          <p:childTnLst>
+            <p:seq>
+              <p:cTn id="84" nodeType="mainSeq"/>
+              <p:prevCondLst>
+                <p:cond delay="0" evt="onPrev">
+                  <p:tgtEl>
+                    <p:sldTgt/>
+                  </p:tgtEl>
+                </p:cond>
+              </p:prevCondLst>
+              <p:nextCondLst>
+                <p:cond delay="0" evt="onNext">
+                  <p:tgtEl>
+                    <p:sldTgt/>
+                  </p:tgtEl>
+                </p:cond>
+              </p:nextCondLst>
+            </p:seq>
+          </p:childTnLst>
+        </p:cTn>
+      </p:par>
+    </p:tnLst>
+  </p:timing>
 </p:sld>
 </file>
 
@@ -12906,7 +13905,7 @@
         <p:spPr>
           <a:xfrm>
             <a:off x="457200" y="274680"/>
-            <a:ext cx="8228880" cy="1142280"/>
+            <a:ext cx="8228160" cy="1141560"/>
           </a:xfrm>
           <a:prstGeom prst="rect">
             <a:avLst/>
@@ -12946,7 +13945,7 @@
         <p:spPr>
           <a:xfrm>
             <a:off x="457200" y="1600200"/>
-            <a:ext cx="8228880" cy="4525200"/>
+            <a:ext cx="8228160" cy="4524480"/>
           </a:xfrm>
           <a:prstGeom prst="rect">
             <a:avLst/>
@@ -13092,6 +14091,33 @@
       </p:sp>
     </p:spTree>
   </p:cSld>
+  <p:timing>
+    <p:tnLst>
+      <p:par>
+        <p:cTn id="85" dur="indefinite" restart="never" nodeType="tmRoot">
+          <p:childTnLst>
+            <p:seq>
+              <p:cTn id="86" nodeType="mainSeq"/>
+              <p:prevCondLst>
+                <p:cond delay="0" evt="onPrev">
+                  <p:tgtEl>
+                    <p:sldTgt/>
+                  </p:tgtEl>
+                </p:cond>
+              </p:prevCondLst>
+              <p:nextCondLst>
+                <p:cond delay="0" evt="onNext">
+                  <p:tgtEl>
+                    <p:sldTgt/>
+                  </p:tgtEl>
+                </p:cond>
+              </p:nextCondLst>
+            </p:seq>
+          </p:childTnLst>
+        </p:cTn>
+      </p:par>
+    </p:tnLst>
+  </p:timing>
 </p:sld>
 </file>
 
@@ -13121,7 +14147,7 @@
         <p:spPr>
           <a:xfrm>
             <a:off x="457200" y="274680"/>
-            <a:ext cx="8228880" cy="1142280"/>
+            <a:ext cx="8228160" cy="1141560"/>
           </a:xfrm>
           <a:prstGeom prst="rect">
             <a:avLst/>
@@ -13161,7 +14187,7 @@
         <p:spPr>
           <a:xfrm>
             <a:off x="457200" y="1600200"/>
-            <a:ext cx="8228880" cy="4525200"/>
+            <a:ext cx="8228160" cy="4524480"/>
           </a:xfrm>
           <a:prstGeom prst="rect">
             <a:avLst/>
@@ -13296,6 +14322,33 @@
       </p:sp>
     </p:spTree>
   </p:cSld>
+  <p:timing>
+    <p:tnLst>
+      <p:par>
+        <p:cTn id="87" dur="indefinite" restart="never" nodeType="tmRoot">
+          <p:childTnLst>
+            <p:seq>
+              <p:cTn id="88" nodeType="mainSeq"/>
+              <p:prevCondLst>
+                <p:cond delay="0" evt="onPrev">
+                  <p:tgtEl>
+                    <p:sldTgt/>
+                  </p:tgtEl>
+                </p:cond>
+              </p:prevCondLst>
+              <p:nextCondLst>
+                <p:cond delay="0" evt="onNext">
+                  <p:tgtEl>
+                    <p:sldTgt/>
+                  </p:tgtEl>
+                </p:cond>
+              </p:nextCondLst>
+            </p:seq>
+          </p:childTnLst>
+        </p:cTn>
+      </p:par>
+    </p:tnLst>
+  </p:timing>
 </p:sld>
 </file>
 
@@ -13325,7 +14378,7 @@
         <p:spPr>
           <a:xfrm>
             <a:off x="457200" y="274680"/>
-            <a:ext cx="8228880" cy="1142280"/>
+            <a:ext cx="8228160" cy="1141560"/>
           </a:xfrm>
           <a:prstGeom prst="rect">
             <a:avLst/>
@@ -13374,7 +14427,7 @@
         <p:spPr>
           <a:xfrm>
             <a:off x="457200" y="1600200"/>
-            <a:ext cx="8228880" cy="4525200"/>
+            <a:ext cx="8228160" cy="4524480"/>
           </a:xfrm>
           <a:prstGeom prst="rect">
             <a:avLst/>
@@ -13524,6 +14577,33 @@
       </p:sp>
     </p:spTree>
   </p:cSld>
+  <p:timing>
+    <p:tnLst>
+      <p:par>
+        <p:cTn id="89" dur="indefinite" restart="never" nodeType="tmRoot">
+          <p:childTnLst>
+            <p:seq>
+              <p:cTn id="90" nodeType="mainSeq"/>
+              <p:prevCondLst>
+                <p:cond delay="0" evt="onPrev">
+                  <p:tgtEl>
+                    <p:sldTgt/>
+                  </p:tgtEl>
+                </p:cond>
+              </p:prevCondLst>
+              <p:nextCondLst>
+                <p:cond delay="0" evt="onNext">
+                  <p:tgtEl>
+                    <p:sldTgt/>
+                  </p:tgtEl>
+                </p:cond>
+              </p:nextCondLst>
+            </p:seq>
+          </p:childTnLst>
+        </p:cTn>
+      </p:par>
+    </p:tnLst>
+  </p:timing>
 </p:sld>
 </file>
 
@@ -13553,7 +14633,7 @@
         <p:spPr>
           <a:xfrm>
             <a:off x="457200" y="274680"/>
-            <a:ext cx="8228880" cy="1142280"/>
+            <a:ext cx="8228160" cy="1141560"/>
           </a:xfrm>
           <a:prstGeom prst="rect">
             <a:avLst/>
@@ -13620,7 +14700,7 @@
         <p:spPr>
           <a:xfrm>
             <a:off x="457200" y="1600200"/>
-            <a:ext cx="8228880" cy="4525200"/>
+            <a:ext cx="8228160" cy="4524480"/>
           </a:xfrm>
           <a:prstGeom prst="rect">
             <a:avLst/>
@@ -13754,6 +14834,33 @@
       </p:sp>
     </p:spTree>
   </p:cSld>
+  <p:timing>
+    <p:tnLst>
+      <p:par>
+        <p:cTn id="91" dur="indefinite" restart="never" nodeType="tmRoot">
+          <p:childTnLst>
+            <p:seq>
+              <p:cTn id="92" nodeType="mainSeq"/>
+              <p:prevCondLst>
+                <p:cond delay="0" evt="onPrev">
+                  <p:tgtEl>
+                    <p:sldTgt/>
+                  </p:tgtEl>
+                </p:cond>
+              </p:prevCondLst>
+              <p:nextCondLst>
+                <p:cond delay="0" evt="onNext">
+                  <p:tgtEl>
+                    <p:sldTgt/>
+                  </p:tgtEl>
+                </p:cond>
+              </p:nextCondLst>
+            </p:seq>
+          </p:childTnLst>
+        </p:cTn>
+      </p:par>
+    </p:tnLst>
+  </p:timing>
 </p:sld>
 </file>
 
@@ -13783,7 +14890,7 @@
         <p:spPr>
           <a:xfrm>
             <a:off x="457200" y="274680"/>
-            <a:ext cx="8228880" cy="1142280"/>
+            <a:ext cx="8228160" cy="1141560"/>
           </a:xfrm>
           <a:prstGeom prst="rect">
             <a:avLst/>
@@ -13823,7 +14930,7 @@
         <p:spPr>
           <a:xfrm>
             <a:off x="457200" y="1600200"/>
-            <a:ext cx="8228880" cy="4525200"/>
+            <a:ext cx="8228160" cy="4524480"/>
           </a:xfrm>
           <a:prstGeom prst="rect">
             <a:avLst/>
@@ -13844,7 +14951,7 @@
               <a:buChar char="•"/>
             </a:pPr>
             <a:r>
-              <a:rPr lang="en-US" sz="3200">
+              <a:rPr lang="en-US" sz="2800">
                 <a:solidFill>
                   <a:srgbClr val="ffffff"/>
                 </a:solidFill>
@@ -13863,7 +14970,7 @@
               <a:buChar char="•"/>
             </a:pPr>
             <a:r>
-              <a:rPr lang="en-US" sz="3200">
+              <a:rPr lang="en-US" sz="2800">
                 <a:solidFill>
                   <a:srgbClr val="ffffff"/>
                 </a:solidFill>
@@ -13882,7 +14989,7 @@
               <a:buChar char="•"/>
             </a:pPr>
             <a:r>
-              <a:rPr lang="en-US" sz="3200">
+              <a:rPr lang="en-US" sz="2800">
                 <a:solidFill>
                   <a:srgbClr val="ffffff"/>
                 </a:solidFill>
@@ -13901,7 +15008,7 @@
               <a:buChar char="•"/>
             </a:pPr>
             <a:r>
-              <a:rPr lang="en-US" sz="3200">
+              <a:rPr lang="en-US" sz="2800">
                 <a:solidFill>
                   <a:srgbClr val="ffffff"/>
                 </a:solidFill>
@@ -13920,7 +15027,7 @@
               <a:buChar char="•"/>
             </a:pPr>
             <a:r>
-              <a:rPr lang="en-US" sz="3200">
+              <a:rPr lang="en-US" sz="2800">
                 <a:solidFill>
                   <a:srgbClr val="ffffff"/>
                 </a:solidFill>
@@ -13939,7 +15046,7 @@
               <a:buChar char="•"/>
             </a:pPr>
             <a:r>
-              <a:rPr lang="en-US" sz="3200" u="sng">
+              <a:rPr lang="en-US" sz="2800" u="sng">
                 <a:solidFill>
                   <a:srgbClr val="ffffff"/>
                 </a:solidFill>
@@ -13948,7 +15055,7 @@
               <a:t>Much</a:t>
             </a:r>
             <a:r>
-              <a:rPr lang="en-US" sz="3200">
+              <a:rPr lang="en-US" sz="2800">
                 <a:solidFill>
                   <a:srgbClr val="ffffff"/>
                 </a:solidFill>
@@ -13962,6 +15069,33 @@
       </p:sp>
     </p:spTree>
   </p:cSld>
+  <p:timing>
+    <p:tnLst>
+      <p:par>
+        <p:cTn id="93" dur="indefinite" restart="never" nodeType="tmRoot">
+          <p:childTnLst>
+            <p:seq>
+              <p:cTn id="94" nodeType="mainSeq"/>
+              <p:prevCondLst>
+                <p:cond delay="0" evt="onPrev">
+                  <p:tgtEl>
+                    <p:sldTgt/>
+                  </p:tgtEl>
+                </p:cond>
+              </p:prevCondLst>
+              <p:nextCondLst>
+                <p:cond delay="0" evt="onNext">
+                  <p:tgtEl>
+                    <p:sldTgt/>
+                  </p:tgtEl>
+                </p:cond>
+              </p:nextCondLst>
+            </p:seq>
+          </p:childTnLst>
+        </p:cTn>
+      </p:par>
+    </p:tnLst>
+  </p:timing>
 </p:sld>
 </file>
 
@@ -13991,7 +15125,7 @@
         <p:spPr>
           <a:xfrm>
             <a:off x="457200" y="274680"/>
-            <a:ext cx="8228880" cy="1142280"/>
+            <a:ext cx="8228160" cy="1141560"/>
           </a:xfrm>
           <a:prstGeom prst="rect">
             <a:avLst/>
@@ -14031,7 +15165,7 @@
         <p:spPr>
           <a:xfrm>
             <a:off x="457200" y="1600200"/>
-            <a:ext cx="8228880" cy="4525200"/>
+            <a:ext cx="8228160" cy="4524480"/>
           </a:xfrm>
           <a:prstGeom prst="rect">
             <a:avLst/>
@@ -14194,6 +15328,33 @@
       </p:sp>
     </p:spTree>
   </p:cSld>
+  <p:timing>
+    <p:tnLst>
+      <p:par>
+        <p:cTn id="9" dur="indefinite" restart="never" nodeType="tmRoot">
+          <p:childTnLst>
+            <p:seq>
+              <p:cTn id="10" nodeType="mainSeq"/>
+              <p:prevCondLst>
+                <p:cond delay="0" evt="onPrev">
+                  <p:tgtEl>
+                    <p:sldTgt/>
+                  </p:tgtEl>
+                </p:cond>
+              </p:prevCondLst>
+              <p:nextCondLst>
+                <p:cond delay="0" evt="onNext">
+                  <p:tgtEl>
+                    <p:sldTgt/>
+                  </p:tgtEl>
+                </p:cond>
+              </p:nextCondLst>
+            </p:seq>
+          </p:childTnLst>
+        </p:cTn>
+      </p:par>
+    </p:tnLst>
+  </p:timing>
 </p:sld>
 </file>
 
@@ -14223,7 +15384,7 @@
         <p:spPr>
           <a:xfrm>
             <a:off x="457200" y="274680"/>
-            <a:ext cx="8228880" cy="1142280"/>
+            <a:ext cx="8228160" cy="1141560"/>
           </a:xfrm>
           <a:prstGeom prst="rect">
             <a:avLst/>
@@ -14263,7 +15424,7 @@
         <p:spPr>
           <a:xfrm>
             <a:off x="457200" y="1600200"/>
-            <a:ext cx="8228880" cy="4525200"/>
+            <a:ext cx="8228160" cy="4524480"/>
           </a:xfrm>
           <a:prstGeom prst="rect">
             <a:avLst/>
@@ -14336,6 +15497,33 @@
       </p:sp>
     </p:spTree>
   </p:cSld>
+  <p:timing>
+    <p:tnLst>
+      <p:par>
+        <p:cTn id="11" dur="indefinite" restart="never" nodeType="tmRoot">
+          <p:childTnLst>
+            <p:seq>
+              <p:cTn id="12" nodeType="mainSeq"/>
+              <p:prevCondLst>
+                <p:cond delay="0" evt="onPrev">
+                  <p:tgtEl>
+                    <p:sldTgt/>
+                  </p:tgtEl>
+                </p:cond>
+              </p:prevCondLst>
+              <p:nextCondLst>
+                <p:cond delay="0" evt="onNext">
+                  <p:tgtEl>
+                    <p:sldTgt/>
+                  </p:tgtEl>
+                </p:cond>
+              </p:nextCondLst>
+            </p:seq>
+          </p:childTnLst>
+        </p:cTn>
+      </p:par>
+    </p:tnLst>
+  </p:timing>
 </p:sld>
 </file>
 
@@ -14365,7 +15553,7 @@
         <p:spPr>
           <a:xfrm>
             <a:off x="457200" y="274680"/>
-            <a:ext cx="8228880" cy="1142280"/>
+            <a:ext cx="8228160" cy="1141560"/>
           </a:xfrm>
           <a:prstGeom prst="rect">
             <a:avLst/>
@@ -14405,7 +15593,7 @@
         <p:spPr>
           <a:xfrm>
             <a:off x="457200" y="1600200"/>
-            <a:ext cx="8228880" cy="4525200"/>
+            <a:ext cx="8228160" cy="4524480"/>
           </a:xfrm>
           <a:prstGeom prst="rect">
             <a:avLst/>
@@ -14426,7 +15614,7 @@
               <a:buChar char="•"/>
             </a:pPr>
             <a:r>
-              <a:rPr lang="en-US" sz="3200">
+              <a:rPr lang="en-US" sz="2400">
                 <a:solidFill>
                   <a:srgbClr val="ffffff"/>
                 </a:solidFill>
@@ -14445,7 +15633,7 @@
               <a:buChar char="•"/>
             </a:pPr>
             <a:r>
-              <a:rPr lang="en-US" sz="3200">
+              <a:rPr lang="en-US" sz="2400">
                 <a:solidFill>
                   <a:srgbClr val="ffffff"/>
                 </a:solidFill>
@@ -14464,7 +15652,7 @@
               <a:buChar char="•"/>
             </a:pPr>
             <a:r>
-              <a:rPr lang="en-US" sz="3200">
+              <a:rPr lang="en-US" sz="2400">
                 <a:solidFill>
                   <a:srgbClr val="ffffff"/>
                 </a:solidFill>
@@ -14483,7 +15671,7 @@
               <a:buChar char="•"/>
             </a:pPr>
             <a:r>
-              <a:rPr lang="en-US" sz="3200">
+              <a:rPr lang="en-US" sz="2400">
                 <a:solidFill>
                   <a:srgbClr val="ffffff"/>
                 </a:solidFill>
@@ -14502,7 +15690,7 @@
               <a:buChar char="•"/>
             </a:pPr>
             <a:r>
-              <a:rPr lang="en-US" sz="3200">
+              <a:rPr lang="en-US" sz="2400">
                 <a:solidFill>
                   <a:srgbClr val="ffffff"/>
                 </a:solidFill>
@@ -14521,7 +15709,7 @@
               <a:buChar char="•"/>
             </a:pPr>
             <a:r>
-              <a:rPr lang="en-US" sz="3200">
+              <a:rPr lang="en-US" sz="2400">
                 <a:solidFill>
                   <a:srgbClr val="ffffff"/>
                 </a:solidFill>
@@ -14543,6 +15731,33 @@
       </p:sp>
     </p:spTree>
   </p:cSld>
+  <p:timing>
+    <p:tnLst>
+      <p:par>
+        <p:cTn id="13" dur="indefinite" restart="never" nodeType="tmRoot">
+          <p:childTnLst>
+            <p:seq>
+              <p:cTn id="14" nodeType="mainSeq"/>
+              <p:prevCondLst>
+                <p:cond delay="0" evt="onPrev">
+                  <p:tgtEl>
+                    <p:sldTgt/>
+                  </p:tgtEl>
+                </p:cond>
+              </p:prevCondLst>
+              <p:nextCondLst>
+                <p:cond delay="0" evt="onNext">
+                  <p:tgtEl>
+                    <p:sldTgt/>
+                  </p:tgtEl>
+                </p:cond>
+              </p:nextCondLst>
+            </p:seq>
+          </p:childTnLst>
+        </p:cTn>
+      </p:par>
+    </p:tnLst>
+  </p:timing>
 </p:sld>
 </file>
 
@@ -14572,7 +15787,7 @@
         <p:spPr>
           <a:xfrm>
             <a:off x="457200" y="274680"/>
-            <a:ext cx="8228880" cy="1142280"/>
+            <a:ext cx="8228160" cy="1141560"/>
           </a:xfrm>
           <a:prstGeom prst="rect">
             <a:avLst/>
@@ -14612,7 +15827,7 @@
         <p:spPr>
           <a:xfrm>
             <a:off x="457200" y="1600200"/>
-            <a:ext cx="8381160" cy="4525200"/>
+            <a:ext cx="8380440" cy="4524480"/>
           </a:xfrm>
           <a:prstGeom prst="rect">
             <a:avLst/>
@@ -14633,7 +15848,7 @@
               <a:buChar char="•"/>
             </a:pPr>
             <a:r>
-              <a:rPr lang="en-US" sz="3200">
+              <a:rPr lang="en-US" sz="2400">
                 <a:solidFill>
                   <a:srgbClr val="ffffff"/>
                 </a:solidFill>
@@ -14652,7 +15867,7 @@
               <a:buChar char="•"/>
             </a:pPr>
             <a:r>
-              <a:rPr lang="en-US" sz="3200">
+              <a:rPr lang="en-US" sz="2400">
                 <a:solidFill>
                   <a:srgbClr val="ffffff"/>
                 </a:solidFill>
@@ -14661,7 +15876,7 @@
               <a:t>Computers basically perform “</a:t>
             </a:r>
             <a:r>
-              <a:rPr i="1" lang="en-US" sz="3200">
+              <a:rPr i="1" lang="en-US" sz="2400">
                 <a:solidFill>
                   <a:srgbClr val="ffffff"/>
                 </a:solidFill>
@@ -14670,7 +15885,7 @@
               <a:t>actions</a:t>
             </a:r>
             <a:r>
-              <a:rPr lang="en-US" sz="3200">
+              <a:rPr lang="en-US" sz="2400">
                 <a:solidFill>
                   <a:srgbClr val="ffffff"/>
                 </a:solidFill>
@@ -14689,7 +15904,7 @@
               <a:buChar char="•"/>
             </a:pPr>
             <a:r>
-              <a:rPr lang="en-US" sz="3200">
+              <a:rPr lang="en-US" sz="2400">
                 <a:solidFill>
                   <a:srgbClr val="ffffff"/>
                 </a:solidFill>
@@ -14698,7 +15913,7 @@
               <a:t>A computer “</a:t>
             </a:r>
             <a:r>
-              <a:rPr i="1" lang="en-US" sz="3200">
+              <a:rPr i="1" lang="en-US" sz="2400">
                 <a:solidFill>
                   <a:srgbClr val="ffffff"/>
                 </a:solidFill>
@@ -14707,7 +15922,7 @@
               <a:t>program</a:t>
             </a:r>
             <a:r>
-              <a:rPr lang="en-US" sz="3200">
+              <a:rPr lang="en-US" sz="2400">
                 <a:solidFill>
                   <a:srgbClr val="ffffff"/>
                 </a:solidFill>
@@ -14716,7 +15931,7 @@
               <a:t>” tells the computer </a:t>
             </a:r>
             <a:r>
-              <a:rPr lang="en-US" sz="3200" u="sng">
+              <a:rPr lang="en-US" sz="2400" u="sng">
                 <a:solidFill>
                   <a:srgbClr val="ffffff"/>
                 </a:solidFill>
@@ -14725,7 +15940,7 @@
               <a:t>exactly </a:t>
             </a:r>
             <a:r>
-              <a:rPr lang="en-US" sz="3200">
+              <a:rPr lang="en-US" sz="2400">
                 <a:solidFill>
                   <a:srgbClr val="ffffff"/>
                 </a:solidFill>
@@ -14734,7 +15949,7 @@
               <a:t>what actions to perform on </a:t>
             </a:r>
             <a:r>
-              <a:rPr lang="en-US" sz="3200" u="sng">
+              <a:rPr lang="en-US" sz="2400" u="sng">
                 <a:solidFill>
                   <a:srgbClr val="ffffff"/>
                 </a:solidFill>
@@ -14743,7 +15958,7 @@
               <a:t>exactly</a:t>
             </a:r>
             <a:r>
-              <a:rPr lang="en-US" sz="3200">
+              <a:rPr lang="en-US" sz="2400">
                 <a:solidFill>
                   <a:srgbClr val="ffffff"/>
                 </a:solidFill>
@@ -14762,7 +15977,7 @@
               <a:buChar char="•"/>
             </a:pPr>
             <a:r>
-              <a:rPr lang="en-US" sz="3200">
+              <a:rPr lang="en-US" sz="2400">
                 <a:solidFill>
                   <a:srgbClr val="ffffff"/>
                 </a:solidFill>
@@ -14771,7 +15986,7 @@
               <a:t>The program does this by providing the “</a:t>
             </a:r>
             <a:r>
-              <a:rPr i="1" lang="en-US" sz="3200">
+              <a:rPr i="1" lang="en-US" sz="2400">
                 <a:solidFill>
                   <a:srgbClr val="ffffff"/>
                 </a:solidFill>
@@ -14780,7 +15995,7 @@
               <a:t>processor</a:t>
             </a:r>
             <a:r>
-              <a:rPr lang="en-US" sz="3200">
+              <a:rPr lang="en-US" sz="2400">
                 <a:solidFill>
                   <a:srgbClr val="ffffff"/>
                 </a:solidFill>
@@ -14789,7 +16004,7 @@
               <a:t>” with “</a:t>
             </a:r>
             <a:r>
-              <a:rPr i="1" lang="en-US" sz="3200">
+              <a:rPr i="1" lang="en-US" sz="2400">
                 <a:solidFill>
                   <a:srgbClr val="ffffff"/>
                 </a:solidFill>
@@ -14798,7 +16013,7 @@
               <a:t>instructions</a:t>
             </a:r>
             <a:r>
-              <a:rPr lang="en-US" sz="3200">
+              <a:rPr lang="en-US" sz="2400">
                 <a:solidFill>
                   <a:srgbClr val="ffffff"/>
                 </a:solidFill>
@@ -14812,6 +16027,33 @@
       </p:sp>
     </p:spTree>
   </p:cSld>
+  <p:timing>
+    <p:tnLst>
+      <p:par>
+        <p:cTn id="15" dur="indefinite" restart="never" nodeType="tmRoot">
+          <p:childTnLst>
+            <p:seq>
+              <p:cTn id="16" nodeType="mainSeq"/>
+              <p:prevCondLst>
+                <p:cond delay="0" evt="onPrev">
+                  <p:tgtEl>
+                    <p:sldTgt/>
+                  </p:tgtEl>
+                </p:cond>
+              </p:prevCondLst>
+              <p:nextCondLst>
+                <p:cond delay="0" evt="onNext">
+                  <p:tgtEl>
+                    <p:sldTgt/>
+                  </p:tgtEl>
+                </p:cond>
+              </p:nextCondLst>
+            </p:seq>
+          </p:childTnLst>
+        </p:cTn>
+      </p:par>
+    </p:tnLst>
+  </p:timing>
 </p:sld>
 </file>
 
@@ -14841,7 +16083,7 @@
         <p:spPr>
           <a:xfrm>
             <a:off x="457200" y="274680"/>
-            <a:ext cx="8228880" cy="1142280"/>
+            <a:ext cx="8228160" cy="1141560"/>
           </a:xfrm>
           <a:prstGeom prst="rect">
             <a:avLst/>
@@ -14899,7 +16141,7 @@
         <p:spPr>
           <a:xfrm>
             <a:off x="304920" y="1600200"/>
-            <a:ext cx="8533800" cy="4525200"/>
+            <a:ext cx="8533080" cy="4524480"/>
           </a:xfrm>
           <a:prstGeom prst="rect">
             <a:avLst/>
@@ -14920,7 +16162,7 @@
               <a:buChar char="•"/>
             </a:pPr>
             <a:r>
-              <a:rPr lang="en-US" sz="3200">
+              <a:rPr lang="en-US" sz="2400">
                 <a:solidFill>
                   <a:srgbClr val="ffffff"/>
                 </a:solidFill>
@@ -14937,7 +16179,7 @@
               </a:lnSpc>
             </a:pPr>
             <a:r>
-              <a:rPr lang="en-US" sz="3200">
+              <a:rPr lang="en-US" sz="2400">
                 <a:solidFill>
                   <a:srgbClr val="ffffff"/>
                 </a:solidFill>
@@ -14956,7 +16198,7 @@
               <a:buChar char="•"/>
             </a:pPr>
             <a:r>
-              <a:rPr lang="en-US" sz="3200">
+              <a:rPr lang="en-US" sz="2400">
                 <a:solidFill>
                   <a:srgbClr val="ffffff"/>
                 </a:solidFill>
@@ -14975,7 +16217,7 @@
               <a:buChar char="•"/>
             </a:pPr>
             <a:r>
-              <a:rPr lang="en-US" sz="3200">
+              <a:rPr lang="en-US" sz="2400">
                 <a:solidFill>
                   <a:srgbClr val="ffffff"/>
                 </a:solidFill>
@@ -14989,6 +16231,33 @@
       </p:sp>
     </p:spTree>
   </p:cSld>
+  <p:timing>
+    <p:tnLst>
+      <p:par>
+        <p:cTn id="17" dur="indefinite" restart="never" nodeType="tmRoot">
+          <p:childTnLst>
+            <p:seq>
+              <p:cTn id="18" nodeType="mainSeq"/>
+              <p:prevCondLst>
+                <p:cond delay="0" evt="onPrev">
+                  <p:tgtEl>
+                    <p:sldTgt/>
+                  </p:tgtEl>
+                </p:cond>
+              </p:prevCondLst>
+              <p:nextCondLst>
+                <p:cond delay="0" evt="onNext">
+                  <p:tgtEl>
+                    <p:sldTgt/>
+                  </p:tgtEl>
+                </p:cond>
+              </p:nextCondLst>
+            </p:seq>
+          </p:childTnLst>
+        </p:cTn>
+      </p:par>
+    </p:tnLst>
+  </p:timing>
 </p:sld>
 </file>
 

</xml_diff>